<commit_message>
Fix error in imaginary part of z_in (0.25 ohms is corrected to be 2.5 ohms)
</commit_message>
<xml_diff>
--- a/transmission_lines/01f_SmithChart_example1.pptx
+++ b/transmission_lines/01f_SmithChart_example1.pptx
@@ -6,14 +6,15 @@
   </p:sldMasterIdLst>
   <p:sldIdLst>
     <p:sldId id="256" r:id="rId2"/>
-    <p:sldId id="263" r:id="rId3"/>
-    <p:sldId id="264" r:id="rId4"/>
-    <p:sldId id="270" r:id="rId5"/>
-    <p:sldId id="269" r:id="rId6"/>
-    <p:sldId id="271" r:id="rId7"/>
-    <p:sldId id="272" r:id="rId8"/>
-    <p:sldId id="273" r:id="rId9"/>
-    <p:sldId id="274" r:id="rId10"/>
+    <p:sldId id="275" r:id="rId3"/>
+    <p:sldId id="263" r:id="rId4"/>
+    <p:sldId id="264" r:id="rId5"/>
+    <p:sldId id="270" r:id="rId6"/>
+    <p:sldId id="269" r:id="rId7"/>
+    <p:sldId id="271" r:id="rId8"/>
+    <p:sldId id="272" r:id="rId9"/>
+    <p:sldId id="273" r:id="rId10"/>
+    <p:sldId id="274" r:id="rId11"/>
   </p:sldIdLst>
   <p:sldSz cx="9144000" cy="6858000" type="screen4x3"/>
   <p:notesSz cx="6858000" cy="9144000"/>
@@ -296,7 +297,7 @@
           <a:p>
             <a:fld id="{9299D62F-1D7F-ED42-BB7F-8326BB7F3730}" type="datetimeFigureOut">
               <a:rPr lang="en-US" smtClean="0"/>
-              <a:t>1/30/15</a:t>
+              <a:t>1/29/16</a:t>
             </a:fld>
             <a:endParaRPr lang="en-US"/>
           </a:p>
@@ -466,7 +467,7 @@
           <a:p>
             <a:fld id="{9299D62F-1D7F-ED42-BB7F-8326BB7F3730}" type="datetimeFigureOut">
               <a:rPr lang="en-US" smtClean="0"/>
-              <a:t>1/30/15</a:t>
+              <a:t>1/29/16</a:t>
             </a:fld>
             <a:endParaRPr lang="en-US"/>
           </a:p>
@@ -646,7 +647,7 @@
           <a:p>
             <a:fld id="{9299D62F-1D7F-ED42-BB7F-8326BB7F3730}" type="datetimeFigureOut">
               <a:rPr lang="en-US" smtClean="0"/>
-              <a:t>1/30/15</a:t>
+              <a:t>1/29/16</a:t>
             </a:fld>
             <a:endParaRPr lang="en-US"/>
           </a:p>
@@ -816,7 +817,7 @@
           <a:p>
             <a:fld id="{9299D62F-1D7F-ED42-BB7F-8326BB7F3730}" type="datetimeFigureOut">
               <a:rPr lang="en-US" smtClean="0"/>
-              <a:t>1/30/15</a:t>
+              <a:t>1/29/16</a:t>
             </a:fld>
             <a:endParaRPr lang="en-US"/>
           </a:p>
@@ -1062,7 +1063,7 @@
           <a:p>
             <a:fld id="{9299D62F-1D7F-ED42-BB7F-8326BB7F3730}" type="datetimeFigureOut">
               <a:rPr lang="en-US" smtClean="0"/>
-              <a:t>1/30/15</a:t>
+              <a:t>1/29/16</a:t>
             </a:fld>
             <a:endParaRPr lang="en-US"/>
           </a:p>
@@ -1350,7 +1351,7 @@
           <a:p>
             <a:fld id="{9299D62F-1D7F-ED42-BB7F-8326BB7F3730}" type="datetimeFigureOut">
               <a:rPr lang="en-US" smtClean="0"/>
-              <a:t>1/30/15</a:t>
+              <a:t>1/29/16</a:t>
             </a:fld>
             <a:endParaRPr lang="en-US"/>
           </a:p>
@@ -1772,7 +1773,7 @@
           <a:p>
             <a:fld id="{9299D62F-1D7F-ED42-BB7F-8326BB7F3730}" type="datetimeFigureOut">
               <a:rPr lang="en-US" smtClean="0"/>
-              <a:t>1/30/15</a:t>
+              <a:t>1/29/16</a:t>
             </a:fld>
             <a:endParaRPr lang="en-US"/>
           </a:p>
@@ -1890,7 +1891,7 @@
           <a:p>
             <a:fld id="{9299D62F-1D7F-ED42-BB7F-8326BB7F3730}" type="datetimeFigureOut">
               <a:rPr lang="en-US" smtClean="0"/>
-              <a:t>1/30/15</a:t>
+              <a:t>1/29/16</a:t>
             </a:fld>
             <a:endParaRPr lang="en-US"/>
           </a:p>
@@ -1985,7 +1986,7 @@
           <a:p>
             <a:fld id="{9299D62F-1D7F-ED42-BB7F-8326BB7F3730}" type="datetimeFigureOut">
               <a:rPr lang="en-US" smtClean="0"/>
-              <a:t>1/30/15</a:t>
+              <a:t>1/29/16</a:t>
             </a:fld>
             <a:endParaRPr lang="en-US"/>
           </a:p>
@@ -2262,7 +2263,7 @@
           <a:p>
             <a:fld id="{9299D62F-1D7F-ED42-BB7F-8326BB7F3730}" type="datetimeFigureOut">
               <a:rPr lang="en-US" smtClean="0"/>
-              <a:t>1/30/15</a:t>
+              <a:t>1/29/16</a:t>
             </a:fld>
             <a:endParaRPr lang="en-US"/>
           </a:p>
@@ -2515,7 +2516,7 @@
           <a:p>
             <a:fld id="{9299D62F-1D7F-ED42-BB7F-8326BB7F3730}" type="datetimeFigureOut">
               <a:rPr lang="en-US" smtClean="0"/>
-              <a:t>1/30/15</a:t>
+              <a:t>1/29/16</a:t>
             </a:fld>
             <a:endParaRPr lang="en-US"/>
           </a:p>
@@ -2728,7 +2729,7 @@
           <a:p>
             <a:fld id="{9299D62F-1D7F-ED42-BB7F-8326BB7F3730}" type="datetimeFigureOut">
               <a:rPr lang="en-US" smtClean="0"/>
-              <a:t>1/30/15</a:t>
+              <a:t>1/29/16</a:t>
             </a:fld>
             <a:endParaRPr lang="en-US"/>
           </a:p>
@@ -3238,109 +3239,6 @@
           </p:txBody>
         </p:sp>
       </p:grpSp>
-      <p:sp>
-        <p:nvSpPr>
-          <p:cNvPr id="9" name="Oval 8"/>
-          <p:cNvSpPr/>
-          <p:nvPr/>
-        </p:nvSpPr>
-        <p:spPr>
-          <a:xfrm>
-            <a:off x="4622829" y="1866121"/>
-            <a:ext cx="88122" cy="88122"/>
-          </a:xfrm>
-          <a:prstGeom prst="ellipse">
-            <a:avLst/>
-          </a:prstGeom>
-          <a:solidFill>
-            <a:srgbClr val="FF0000"/>
-          </a:solidFill>
-          <a:ln>
-            <a:solidFill>
-              <a:schemeClr val="tx1"/>
-            </a:solidFill>
-          </a:ln>
-          <a:effectLst/>
-        </p:spPr>
-        <p:style>
-          <a:lnRef idx="1">
-            <a:schemeClr val="accent1"/>
-          </a:lnRef>
-          <a:fillRef idx="3">
-            <a:schemeClr val="accent1"/>
-          </a:fillRef>
-          <a:effectRef idx="2">
-            <a:schemeClr val="accent1"/>
-          </a:effectRef>
-          <a:fontRef idx="minor">
-            <a:schemeClr val="lt1"/>
-          </a:fontRef>
-        </p:style>
-        <p:txBody>
-          <a:bodyPr rtlCol="0" anchor="ctr"/>
-          <a:lstStyle/>
-          <a:p>
-            <a:pPr algn="ctr"/>
-            <a:endParaRPr lang="en-US"/>
-          </a:p>
-        </p:txBody>
-      </p:sp>
-      <p:sp>
-        <p:nvSpPr>
-          <p:cNvPr id="10" name="TextBox 9"/>
-          <p:cNvSpPr txBox="1"/>
-          <p:nvPr/>
-        </p:nvSpPr>
-        <p:spPr>
-          <a:xfrm>
-            <a:off x="3094247" y="1709363"/>
-            <a:ext cx="1454244" cy="369332"/>
-          </a:xfrm>
-          <a:prstGeom prst="rect">
-            <a:avLst/>
-          </a:prstGeom>
-          <a:solidFill>
-            <a:srgbClr val="FFFFFF"/>
-          </a:solidFill>
-        </p:spPr>
-        <p:txBody>
-          <a:bodyPr wrap="none" rtlCol="0">
-            <a:spAutoFit/>
-          </a:bodyPr>
-          <a:lstStyle/>
-          <a:p>
-            <a:r>
-              <a:rPr lang="en-US" dirty="0" err="1" smtClean="0">
-                <a:solidFill>
-                  <a:srgbClr val="FF0000"/>
-                </a:solidFill>
-              </a:rPr>
-              <a:t>z</a:t>
-            </a:r>
-            <a:r>
-              <a:rPr lang="en-US" baseline="-25000" dirty="0" err="1" smtClean="0">
-                <a:solidFill>
-                  <a:srgbClr val="FF0000"/>
-                </a:solidFill>
-              </a:rPr>
-              <a:t>L</a:t>
-            </a:r>
-            <a:r>
-              <a:rPr lang="en-US" dirty="0" smtClean="0">
-                <a:solidFill>
-                  <a:srgbClr val="FF0000"/>
-                </a:solidFill>
-              </a:rPr>
-              <a:t> = 0.5 + j0.8</a:t>
-            </a:r>
-            <a:endParaRPr lang="en-US" dirty="0">
-              <a:solidFill>
-                <a:srgbClr val="FF0000"/>
-              </a:solidFill>
-            </a:endParaRPr>
-          </a:p>
-        </p:txBody>
-      </p:sp>
     </p:spTree>
     <p:extLst>
       <p:ext uri="{BB962C8B-B14F-4D97-AF65-F5344CB8AC3E}">
@@ -3361,7 +3259,7 @@
 </p:sld>
 </file>
 
-<file path=ppt/slides/slide2.xml><?xml version="1.0" encoding="utf-8"?>
+<file path=ppt/slides/slide10.xml><?xml version="1.0" encoding="utf-8"?>
 <p:sld xmlns:a="http://schemas.openxmlformats.org/drawingml/2006/main" xmlns:r="http://schemas.openxmlformats.org/officeDocument/2006/relationships" xmlns:p="http://schemas.openxmlformats.org/presentationml/2006/main">
   <p:cSld>
     <p:spTree>
@@ -3616,6 +3514,104 @@
           </a:p>
         </p:txBody>
       </p:sp>
+      <p:sp>
+        <p:nvSpPr>
+          <p:cNvPr id="12" name="TextBox 11"/>
+          <p:cNvSpPr txBox="1"/>
+          <p:nvPr/>
+        </p:nvSpPr>
+        <p:spPr>
+          <a:xfrm>
+            <a:off x="4778996" y="82115"/>
+            <a:ext cx="720607" cy="369332"/>
+          </a:xfrm>
+          <a:prstGeom prst="rect">
+            <a:avLst/>
+          </a:prstGeom>
+          <a:solidFill>
+            <a:srgbClr val="FFFFFF"/>
+          </a:solidFill>
+        </p:spPr>
+        <p:txBody>
+          <a:bodyPr wrap="none" rtlCol="0">
+            <a:spAutoFit/>
+          </a:bodyPr>
+          <a:lstStyle/>
+          <a:p>
+            <a:r>
+              <a:rPr lang="en-US" dirty="0" smtClean="0">
+                <a:solidFill>
+                  <a:srgbClr val="FF0000"/>
+                </a:solidFill>
+              </a:rPr>
+              <a:t>0.12</a:t>
+            </a:r>
+            <a:r>
+              <a:rPr lang="en-US" dirty="0" smtClean="0">
+                <a:solidFill>
+                  <a:srgbClr val="FF0000"/>
+                </a:solidFill>
+                <a:latin typeface="Symbol" charset="2"/>
+                <a:cs typeface="Symbol" charset="2"/>
+              </a:rPr>
+              <a:t>l</a:t>
+            </a:r>
+            <a:endParaRPr lang="en-US" dirty="0">
+              <a:solidFill>
+                <a:srgbClr val="FF0000"/>
+              </a:solidFill>
+            </a:endParaRPr>
+          </a:p>
+        </p:txBody>
+      </p:sp>
+      <p:sp>
+        <p:nvSpPr>
+          <p:cNvPr id="13" name="Arc 12"/>
+          <p:cNvSpPr/>
+          <p:nvPr/>
+        </p:nvSpPr>
+        <p:spPr>
+          <a:xfrm>
+            <a:off x="3208131" y="1899196"/>
+            <a:ext cx="3143511" cy="3203342"/>
+          </a:xfrm>
+          <a:prstGeom prst="arc">
+            <a:avLst>
+              <a:gd name="adj1" fmla="val 15897266"/>
+              <a:gd name="adj2" fmla="val 10548614"/>
+            </a:avLst>
+          </a:prstGeom>
+          <a:noFill/>
+          <a:ln>
+            <a:solidFill>
+              <a:srgbClr val="FF0000"/>
+            </a:solidFill>
+          </a:ln>
+          <a:effectLst/>
+        </p:spPr>
+        <p:style>
+          <a:lnRef idx="2">
+            <a:schemeClr val="accent1"/>
+          </a:lnRef>
+          <a:fillRef idx="0">
+            <a:schemeClr val="accent1"/>
+          </a:fillRef>
+          <a:effectRef idx="1">
+            <a:schemeClr val="accent1"/>
+          </a:effectRef>
+          <a:fontRef idx="minor">
+            <a:schemeClr val="tx1"/>
+          </a:fontRef>
+        </p:style>
+        <p:txBody>
+          <a:bodyPr rtlCol="0" anchor="ctr"/>
+          <a:lstStyle/>
+          <a:p>
+            <a:pPr algn="ctr"/>
+            <a:endParaRPr lang="en-US"/>
+          </a:p>
+        </p:txBody>
+      </p:sp>
       <p:cxnSp>
         <p:nvCxnSpPr>
           <p:cNvPr id="11" name="Straight Connector 10"/>
@@ -3655,14 +3651,14 @@
       </p:cxnSp>
       <p:sp>
         <p:nvSpPr>
-          <p:cNvPr id="12" name="TextBox 11"/>
+          <p:cNvPr id="14" name="TextBox 13"/>
           <p:cNvSpPr txBox="1"/>
           <p:nvPr/>
         </p:nvSpPr>
         <p:spPr>
           <a:xfrm>
-            <a:off x="4778996" y="82115"/>
-            <a:ext cx="720607" cy="369332"/>
+            <a:off x="1960034" y="2992912"/>
+            <a:ext cx="1543136" cy="369332"/>
           </a:xfrm>
           <a:prstGeom prst="rect">
             <a:avLst/>
@@ -3678,22 +3674,44 @@
           <a:lstStyle/>
           <a:p>
             <a:r>
-              <a:rPr lang="en-US" dirty="0" smtClean="0">
-                <a:solidFill>
-                  <a:srgbClr val="FF0000"/>
-                </a:solidFill>
-              </a:rPr>
-              <a:t>0.12</a:t>
-            </a:r>
-            <a:r>
-              <a:rPr lang="en-US" dirty="0" smtClean="0">
-                <a:solidFill>
-                  <a:srgbClr val="FF0000"/>
-                </a:solidFill>
-                <a:latin typeface="Symbol" charset="2"/>
-                <a:cs typeface="Symbol" charset="2"/>
-              </a:rPr>
-              <a:t>l</a:t>
+              <a:rPr lang="en-US" dirty="0" err="1" smtClean="0">
+                <a:solidFill>
+                  <a:srgbClr val="FF0000"/>
+                </a:solidFill>
+              </a:rPr>
+              <a:t>z</a:t>
+            </a:r>
+            <a:r>
+              <a:rPr lang="en-US" baseline="-25000" dirty="0" err="1" smtClean="0">
+                <a:solidFill>
+                  <a:srgbClr val="FF0000"/>
+                </a:solidFill>
+              </a:rPr>
+              <a:t>in</a:t>
+            </a:r>
+            <a:r>
+              <a:rPr lang="en-US" dirty="0" smtClean="0">
+                <a:solidFill>
+                  <a:srgbClr val="FF0000"/>
+                </a:solidFill>
+              </a:rPr>
+              <a:t> = 0.3 </a:t>
+            </a:r>
+            <a:r>
+              <a:rPr lang="en-US" dirty="0">
+                <a:solidFill>
+                  <a:srgbClr val="FF0000"/>
+                </a:solidFill>
+              </a:rPr>
+              <a:t>-</a:t>
+            </a:r>
+            <a:r>
+              <a:rPr lang="en-US" dirty="0" smtClean="0">
+                <a:solidFill>
+                  <a:srgbClr val="FF0000"/>
+                </a:solidFill>
+              </a:rPr>
+              <a:t> j0.05</a:t>
             </a:r>
             <a:endParaRPr lang="en-US" dirty="0">
               <a:solidFill>
@@ -3703,10 +3721,713 @@
           </a:p>
         </p:txBody>
       </p:sp>
+      <p:sp>
+        <p:nvSpPr>
+          <p:cNvPr id="15" name="TextBox 14"/>
+          <p:cNvSpPr txBox="1"/>
+          <p:nvPr/>
+        </p:nvSpPr>
+        <p:spPr>
+          <a:xfrm>
+            <a:off x="463775" y="2623580"/>
+            <a:ext cx="964289" cy="923330"/>
+          </a:xfrm>
+          <a:prstGeom prst="rect">
+            <a:avLst/>
+          </a:prstGeom>
+          <a:solidFill>
+            <a:srgbClr val="FFFFFF"/>
+          </a:solidFill>
+        </p:spPr>
+        <p:txBody>
+          <a:bodyPr wrap="none" rtlCol="0">
+            <a:spAutoFit/>
+          </a:bodyPr>
+          <a:lstStyle/>
+          <a:p>
+            <a:r>
+              <a:rPr lang="en-US" dirty="0" smtClean="0">
+                <a:solidFill>
+                  <a:srgbClr val="FF0000"/>
+                </a:solidFill>
+              </a:rPr>
+              <a:t>  0.12</a:t>
+            </a:r>
+            <a:r>
+              <a:rPr lang="en-US" dirty="0" smtClean="0">
+                <a:solidFill>
+                  <a:srgbClr val="FF0000"/>
+                </a:solidFill>
+                <a:latin typeface="Symbol" charset="2"/>
+                <a:cs typeface="Symbol" charset="2"/>
+              </a:rPr>
+              <a:t>l</a:t>
+            </a:r>
+          </a:p>
+          <a:p>
+            <a:r>
+              <a:rPr lang="en-US" dirty="0" smtClean="0">
+                <a:solidFill>
+                  <a:srgbClr val="FF0000"/>
+                </a:solidFill>
+              </a:rPr>
+              <a:t>+0.375</a:t>
+            </a:r>
+            <a:r>
+              <a:rPr lang="en-US" dirty="0" smtClean="0">
+                <a:solidFill>
+                  <a:srgbClr val="FF0000"/>
+                </a:solidFill>
+                <a:latin typeface="Symbol" charset="2"/>
+                <a:cs typeface="Symbol" charset="2"/>
+              </a:rPr>
+              <a:t>l</a:t>
+            </a:r>
+          </a:p>
+          <a:p>
+            <a:r>
+              <a:rPr lang="en-US" dirty="0" smtClean="0">
+                <a:solidFill>
+                  <a:srgbClr val="FF0000"/>
+                </a:solidFill>
+                <a:latin typeface="Symbol" charset="2"/>
+                <a:cs typeface="Symbol" charset="2"/>
+              </a:rPr>
+              <a:t>=</a:t>
+            </a:r>
+            <a:r>
+              <a:rPr lang="en-US" dirty="0" smtClean="0">
+                <a:solidFill>
+                  <a:srgbClr val="FF0000"/>
+                </a:solidFill>
+              </a:rPr>
+              <a:t>0.495</a:t>
+            </a:r>
+            <a:r>
+              <a:rPr lang="en-US" dirty="0" smtClean="0">
+                <a:solidFill>
+                  <a:srgbClr val="FF0000"/>
+                </a:solidFill>
+                <a:latin typeface="Symbol" charset="2"/>
+                <a:cs typeface="Symbol" charset="2"/>
+              </a:rPr>
+              <a:t>l</a:t>
+            </a:r>
+            <a:endParaRPr lang="en-US" dirty="0">
+              <a:solidFill>
+                <a:srgbClr val="FF0000"/>
+              </a:solidFill>
+            </a:endParaRPr>
+          </a:p>
+        </p:txBody>
+      </p:sp>
+      <p:cxnSp>
+        <p:nvCxnSpPr>
+          <p:cNvPr id="16" name="Straight Connector 15"/>
+          <p:cNvCxnSpPr/>
+          <p:nvPr/>
+        </p:nvCxnSpPr>
+        <p:spPr>
+          <a:xfrm flipH="1">
+            <a:off x="1190647" y="3481691"/>
+            <a:ext cx="3588352" cy="229269"/>
+          </a:xfrm>
+          <a:prstGeom prst="line">
+            <a:avLst/>
+          </a:prstGeom>
+          <a:ln>
+            <a:solidFill>
+              <a:srgbClr val="FF0000"/>
+            </a:solidFill>
+            <a:prstDash val="sysDash"/>
+          </a:ln>
+          <a:effectLst/>
+        </p:spPr>
+        <p:style>
+          <a:lnRef idx="2">
+            <a:schemeClr val="accent1"/>
+          </a:lnRef>
+          <a:fillRef idx="0">
+            <a:schemeClr val="accent1"/>
+          </a:fillRef>
+          <a:effectRef idx="1">
+            <a:schemeClr val="accent1"/>
+          </a:effectRef>
+          <a:fontRef idx="minor">
+            <a:schemeClr val="tx1"/>
+          </a:fontRef>
+        </p:style>
+      </p:cxnSp>
+      <p:sp>
+        <p:nvSpPr>
+          <p:cNvPr id="17" name="Oval 16"/>
+          <p:cNvSpPr/>
+          <p:nvPr/>
+        </p:nvSpPr>
+        <p:spPr>
+          <a:xfrm>
+            <a:off x="3164070" y="3521426"/>
+            <a:ext cx="88122" cy="88122"/>
+          </a:xfrm>
+          <a:prstGeom prst="ellipse">
+            <a:avLst/>
+          </a:prstGeom>
+          <a:solidFill>
+            <a:srgbClr val="FF0000"/>
+          </a:solidFill>
+          <a:ln>
+            <a:solidFill>
+              <a:schemeClr val="tx1"/>
+            </a:solidFill>
+          </a:ln>
+          <a:effectLst/>
+        </p:spPr>
+        <p:style>
+          <a:lnRef idx="1">
+            <a:schemeClr val="accent1"/>
+          </a:lnRef>
+          <a:fillRef idx="3">
+            <a:schemeClr val="accent1"/>
+          </a:fillRef>
+          <a:effectRef idx="2">
+            <a:schemeClr val="accent1"/>
+          </a:effectRef>
+          <a:fontRef idx="minor">
+            <a:schemeClr val="lt1"/>
+          </a:fontRef>
+        </p:style>
+        <p:txBody>
+          <a:bodyPr rtlCol="0" anchor="ctr"/>
+          <a:lstStyle/>
+          <a:p>
+            <a:pPr algn="ctr"/>
+            <a:endParaRPr lang="en-US"/>
+          </a:p>
+        </p:txBody>
+      </p:sp>
+      <p:cxnSp>
+        <p:nvCxnSpPr>
+          <p:cNvPr id="19" name="Straight Connector 18"/>
+          <p:cNvCxnSpPr/>
+          <p:nvPr/>
+        </p:nvCxnSpPr>
+        <p:spPr>
+          <a:xfrm>
+            <a:off x="535791" y="3241302"/>
+            <a:ext cx="767305" cy="0"/>
+          </a:xfrm>
+          <a:prstGeom prst="line">
+            <a:avLst/>
+          </a:prstGeom>
+          <a:ln>
+            <a:solidFill>
+              <a:srgbClr val="FF0000"/>
+            </a:solidFill>
+          </a:ln>
+          <a:effectLst/>
+        </p:spPr>
+        <p:style>
+          <a:lnRef idx="2">
+            <a:schemeClr val="accent1"/>
+          </a:lnRef>
+          <a:fillRef idx="0">
+            <a:schemeClr val="accent1"/>
+          </a:fillRef>
+          <a:effectRef idx="1">
+            <a:schemeClr val="accent1"/>
+          </a:effectRef>
+          <a:fontRef idx="minor">
+            <a:schemeClr val="tx1"/>
+          </a:fontRef>
+        </p:style>
+      </p:cxnSp>
+      <p:sp>
+        <p:nvSpPr>
+          <p:cNvPr id="18" name="TextBox 17"/>
+          <p:cNvSpPr txBox="1"/>
+          <p:nvPr/>
+        </p:nvSpPr>
+        <p:spPr>
+          <a:xfrm>
+            <a:off x="300365" y="5021407"/>
+            <a:ext cx="1643035" cy="646331"/>
+          </a:xfrm>
+          <a:prstGeom prst="rect">
+            <a:avLst/>
+          </a:prstGeom>
+          <a:solidFill>
+            <a:srgbClr val="FFFFFF"/>
+          </a:solidFill>
+        </p:spPr>
+        <p:txBody>
+          <a:bodyPr wrap="none" rtlCol="0">
+            <a:spAutoFit/>
+          </a:bodyPr>
+          <a:lstStyle/>
+          <a:p>
+            <a:r>
+              <a:rPr lang="en-US" dirty="0" err="1">
+                <a:solidFill>
+                  <a:srgbClr val="FF0000"/>
+                </a:solidFill>
+              </a:rPr>
+              <a:t>Z</a:t>
+            </a:r>
+            <a:r>
+              <a:rPr lang="en-US" baseline="-25000" dirty="0" err="1" smtClean="0">
+                <a:solidFill>
+                  <a:srgbClr val="FF0000"/>
+                </a:solidFill>
+              </a:rPr>
+              <a:t>in</a:t>
+            </a:r>
+            <a:r>
+              <a:rPr lang="en-US" dirty="0" smtClean="0">
+                <a:solidFill>
+                  <a:srgbClr val="FF0000"/>
+                </a:solidFill>
+              </a:rPr>
+              <a:t> = Z</a:t>
+            </a:r>
+            <a:r>
+              <a:rPr lang="en-US" baseline="-25000" dirty="0" smtClean="0">
+                <a:solidFill>
+                  <a:srgbClr val="FF0000"/>
+                </a:solidFill>
+              </a:rPr>
+              <a:t>0</a:t>
+            </a:r>
+            <a:r>
+              <a:rPr lang="en-US" dirty="0" smtClean="0">
+                <a:solidFill>
+                  <a:srgbClr val="FF0000"/>
+                </a:solidFill>
+              </a:rPr>
+              <a:t>z</a:t>
+            </a:r>
+            <a:r>
+              <a:rPr lang="en-US" baseline="-25000" dirty="0" smtClean="0">
+                <a:solidFill>
+                  <a:srgbClr val="FF0000"/>
+                </a:solidFill>
+              </a:rPr>
+              <a:t>in</a:t>
+            </a:r>
+          </a:p>
+          <a:p>
+            <a:r>
+              <a:rPr lang="en-US" dirty="0" smtClean="0">
+                <a:solidFill>
+                  <a:srgbClr val="FF0000"/>
+                </a:solidFill>
+              </a:rPr>
+              <a:t>     = 15 </a:t>
+            </a:r>
+            <a:r>
+              <a:rPr lang="en-US" dirty="0" smtClean="0">
+                <a:solidFill>
+                  <a:srgbClr val="FF0000"/>
+                </a:solidFill>
+              </a:rPr>
+              <a:t>– j2.5 </a:t>
+            </a:r>
+            <a:r>
+              <a:rPr lang="en-US" dirty="0" smtClean="0">
+                <a:solidFill>
+                  <a:srgbClr val="FF0000"/>
+                </a:solidFill>
+                <a:latin typeface="Symbol" charset="2"/>
+                <a:cs typeface="Symbol" charset="2"/>
+              </a:rPr>
+              <a:t>W</a:t>
+            </a:r>
+            <a:endParaRPr lang="en-US" dirty="0">
+              <a:solidFill>
+                <a:srgbClr val="FF0000"/>
+              </a:solidFill>
+              <a:latin typeface="Symbol" charset="2"/>
+              <a:cs typeface="Symbol" charset="2"/>
+            </a:endParaRPr>
+          </a:p>
+        </p:txBody>
+      </p:sp>
+      <p:sp>
+        <p:nvSpPr>
+          <p:cNvPr id="20" name="TextBox 19"/>
+          <p:cNvSpPr txBox="1"/>
+          <p:nvPr/>
+        </p:nvSpPr>
+        <p:spPr>
+          <a:xfrm>
+            <a:off x="6415090" y="3601296"/>
+            <a:ext cx="1263988" cy="369332"/>
+          </a:xfrm>
+          <a:prstGeom prst="rect">
+            <a:avLst/>
+          </a:prstGeom>
+          <a:solidFill>
+            <a:srgbClr val="FFFFFF"/>
+          </a:solidFill>
+        </p:spPr>
+        <p:txBody>
+          <a:bodyPr wrap="none" rtlCol="0">
+            <a:spAutoFit/>
+          </a:bodyPr>
+          <a:lstStyle/>
+          <a:p>
+            <a:r>
+              <a:rPr lang="en-US" dirty="0" smtClean="0">
+                <a:solidFill>
+                  <a:srgbClr val="FF0000"/>
+                </a:solidFill>
+              </a:rPr>
+              <a:t>VSWR = 3.5</a:t>
+            </a:r>
+            <a:endParaRPr lang="en-US" dirty="0">
+              <a:solidFill>
+                <a:srgbClr val="FF0000"/>
+              </a:solidFill>
+            </a:endParaRPr>
+          </a:p>
+        </p:txBody>
+      </p:sp>
+      <p:sp>
+        <p:nvSpPr>
+          <p:cNvPr id="21" name="Oval 20"/>
+          <p:cNvSpPr/>
+          <p:nvPr/>
+        </p:nvSpPr>
+        <p:spPr>
+          <a:xfrm>
+            <a:off x="6304753" y="3433304"/>
+            <a:ext cx="88122" cy="88122"/>
+          </a:xfrm>
+          <a:prstGeom prst="ellipse">
+            <a:avLst/>
+          </a:prstGeom>
+          <a:solidFill>
+            <a:srgbClr val="FF0000"/>
+          </a:solidFill>
+          <a:ln>
+            <a:solidFill>
+              <a:schemeClr val="tx1"/>
+            </a:solidFill>
+          </a:ln>
+          <a:effectLst/>
+        </p:spPr>
+        <p:style>
+          <a:lnRef idx="1">
+            <a:schemeClr val="accent1"/>
+          </a:lnRef>
+          <a:fillRef idx="3">
+            <a:schemeClr val="accent1"/>
+          </a:fillRef>
+          <a:effectRef idx="2">
+            <a:schemeClr val="accent1"/>
+          </a:effectRef>
+          <a:fontRef idx="minor">
+            <a:schemeClr val="lt1"/>
+          </a:fontRef>
+        </p:style>
+        <p:txBody>
+          <a:bodyPr rtlCol="0" anchor="ctr"/>
+          <a:lstStyle/>
+          <a:p>
+            <a:pPr algn="ctr"/>
+            <a:endParaRPr lang="en-US"/>
+          </a:p>
+        </p:txBody>
+      </p:sp>
+      <p:cxnSp>
+        <p:nvCxnSpPr>
+          <p:cNvPr id="25" name="Straight Connector 24"/>
+          <p:cNvCxnSpPr/>
+          <p:nvPr/>
+        </p:nvCxnSpPr>
+        <p:spPr>
+          <a:xfrm flipH="1">
+            <a:off x="4778999" y="3495178"/>
+            <a:ext cx="3804825" cy="0"/>
+          </a:xfrm>
+          <a:prstGeom prst="line">
+            <a:avLst/>
+          </a:prstGeom>
+          <a:ln>
+            <a:solidFill>
+              <a:srgbClr val="FF0000"/>
+            </a:solidFill>
+            <a:prstDash val="sysDash"/>
+          </a:ln>
+          <a:effectLst/>
+        </p:spPr>
+        <p:style>
+          <a:lnRef idx="2">
+            <a:schemeClr val="accent1"/>
+          </a:lnRef>
+          <a:fillRef idx="0">
+            <a:schemeClr val="accent1"/>
+          </a:fillRef>
+          <a:effectRef idx="1">
+            <a:schemeClr val="accent1"/>
+          </a:effectRef>
+          <a:fontRef idx="minor">
+            <a:schemeClr val="tx1"/>
+          </a:fontRef>
+        </p:style>
+      </p:cxnSp>
+      <p:sp>
+        <p:nvSpPr>
+          <p:cNvPr id="29" name="Arc 28"/>
+          <p:cNvSpPr/>
+          <p:nvPr/>
+        </p:nvSpPr>
+        <p:spPr>
+          <a:xfrm>
+            <a:off x="1303096" y="82115"/>
+            <a:ext cx="7014312" cy="6855257"/>
+          </a:xfrm>
+          <a:prstGeom prst="arc">
+            <a:avLst>
+              <a:gd name="adj1" fmla="val 15943104"/>
+              <a:gd name="adj2" fmla="val 0"/>
+            </a:avLst>
+          </a:prstGeom>
+          <a:ln w="12700" cmpd="sng">
+            <a:solidFill>
+              <a:srgbClr val="FF0000"/>
+            </a:solidFill>
+            <a:prstDash val="sysDash"/>
+            <a:headEnd type="none"/>
+            <a:tailEnd type="triangle"/>
+          </a:ln>
+          <a:effectLst/>
+        </p:spPr>
+        <p:style>
+          <a:lnRef idx="2">
+            <a:schemeClr val="accent1"/>
+          </a:lnRef>
+          <a:fillRef idx="0">
+            <a:schemeClr val="accent1"/>
+          </a:fillRef>
+          <a:effectRef idx="1">
+            <a:schemeClr val="accent1"/>
+          </a:effectRef>
+          <a:fontRef idx="minor">
+            <a:schemeClr val="tx1"/>
+          </a:fontRef>
+        </p:style>
+        <p:txBody>
+          <a:bodyPr rtlCol="0" anchor="ctr"/>
+          <a:lstStyle/>
+          <a:p>
+            <a:pPr algn="ctr"/>
+            <a:endParaRPr lang="en-US"/>
+          </a:p>
+        </p:txBody>
+      </p:sp>
+      <p:sp>
+        <p:nvSpPr>
+          <p:cNvPr id="30" name="TextBox 29"/>
+          <p:cNvSpPr txBox="1"/>
+          <p:nvPr/>
+        </p:nvSpPr>
+        <p:spPr>
+          <a:xfrm>
+            <a:off x="7612056" y="394585"/>
+            <a:ext cx="847295" cy="923330"/>
+          </a:xfrm>
+          <a:prstGeom prst="rect">
+            <a:avLst/>
+          </a:prstGeom>
+          <a:solidFill>
+            <a:srgbClr val="FFFFFF"/>
+          </a:solidFill>
+        </p:spPr>
+        <p:txBody>
+          <a:bodyPr wrap="none" rtlCol="0">
+            <a:spAutoFit/>
+          </a:bodyPr>
+          <a:lstStyle/>
+          <a:p>
+            <a:r>
+              <a:rPr lang="en-US" dirty="0" smtClean="0">
+                <a:solidFill>
+                  <a:srgbClr val="FF0000"/>
+                </a:solidFill>
+              </a:rPr>
+              <a:t>  0.25</a:t>
+            </a:r>
+            <a:r>
+              <a:rPr lang="en-US" dirty="0" smtClean="0">
+                <a:solidFill>
+                  <a:srgbClr val="FF0000"/>
+                </a:solidFill>
+                <a:latin typeface="Symbol" charset="2"/>
+                <a:cs typeface="Symbol" charset="2"/>
+              </a:rPr>
+              <a:t>l</a:t>
+            </a:r>
+          </a:p>
+          <a:p>
+            <a:r>
+              <a:rPr lang="en-US" smtClean="0">
+                <a:solidFill>
+                  <a:srgbClr val="FF0000"/>
+                </a:solidFill>
+              </a:rPr>
+              <a:t> -0.12</a:t>
+            </a:r>
+            <a:r>
+              <a:rPr lang="en-US" smtClean="0">
+                <a:solidFill>
+                  <a:srgbClr val="FF0000"/>
+                </a:solidFill>
+                <a:latin typeface="Symbol" charset="2"/>
+                <a:cs typeface="Symbol" charset="2"/>
+              </a:rPr>
+              <a:t>l</a:t>
+            </a:r>
+            <a:endParaRPr lang="en-US" dirty="0" smtClean="0">
+              <a:solidFill>
+                <a:srgbClr val="FF0000"/>
+              </a:solidFill>
+              <a:latin typeface="Symbol" charset="2"/>
+              <a:cs typeface="Symbol" charset="2"/>
+            </a:endParaRPr>
+          </a:p>
+          <a:p>
+            <a:r>
+              <a:rPr lang="en-US" dirty="0" smtClean="0">
+                <a:solidFill>
+                  <a:srgbClr val="FF0000"/>
+                </a:solidFill>
+                <a:latin typeface="Symbol" charset="2"/>
+                <a:cs typeface="Symbol" charset="2"/>
+              </a:rPr>
+              <a:t>=</a:t>
+            </a:r>
+            <a:r>
+              <a:rPr lang="en-US" dirty="0" smtClean="0">
+                <a:solidFill>
+                  <a:srgbClr val="FF0000"/>
+                </a:solidFill>
+              </a:rPr>
+              <a:t>0.13</a:t>
+            </a:r>
+            <a:r>
+              <a:rPr lang="en-US" dirty="0" smtClean="0">
+                <a:solidFill>
+                  <a:srgbClr val="FF0000"/>
+                </a:solidFill>
+                <a:latin typeface="Symbol" charset="2"/>
+                <a:cs typeface="Symbol" charset="2"/>
+              </a:rPr>
+              <a:t>l</a:t>
+            </a:r>
+            <a:endParaRPr lang="en-US" dirty="0">
+              <a:solidFill>
+                <a:srgbClr val="FF0000"/>
+              </a:solidFill>
+            </a:endParaRPr>
+          </a:p>
+        </p:txBody>
+      </p:sp>
+      <p:cxnSp>
+        <p:nvCxnSpPr>
+          <p:cNvPr id="31" name="Straight Connector 30"/>
+          <p:cNvCxnSpPr/>
+          <p:nvPr/>
+        </p:nvCxnSpPr>
+        <p:spPr>
+          <a:xfrm>
+            <a:off x="7679078" y="1014904"/>
+            <a:ext cx="767305" cy="0"/>
+          </a:xfrm>
+          <a:prstGeom prst="line">
+            <a:avLst/>
+          </a:prstGeom>
+          <a:ln>
+            <a:solidFill>
+              <a:srgbClr val="FF0000"/>
+            </a:solidFill>
+          </a:ln>
+          <a:effectLst/>
+        </p:spPr>
+        <p:style>
+          <a:lnRef idx="2">
+            <a:schemeClr val="accent1"/>
+          </a:lnRef>
+          <a:fillRef idx="0">
+            <a:schemeClr val="accent1"/>
+          </a:fillRef>
+          <a:effectRef idx="1">
+            <a:schemeClr val="accent1"/>
+          </a:effectRef>
+          <a:fontRef idx="minor">
+            <a:schemeClr val="tx1"/>
+          </a:fontRef>
+        </p:style>
+      </p:cxnSp>
+      <p:sp>
+        <p:nvSpPr>
+          <p:cNvPr id="32" name="TextBox 31"/>
+          <p:cNvSpPr txBox="1"/>
+          <p:nvPr/>
+        </p:nvSpPr>
+        <p:spPr>
+          <a:xfrm>
+            <a:off x="6585441" y="5393"/>
+            <a:ext cx="2053229" cy="523220"/>
+          </a:xfrm>
+          <a:prstGeom prst="rect">
+            <a:avLst/>
+          </a:prstGeom>
+          <a:noFill/>
+        </p:spPr>
+        <p:txBody>
+          <a:bodyPr wrap="none" rtlCol="0">
+            <a:spAutoFit/>
+          </a:bodyPr>
+          <a:lstStyle/>
+          <a:p>
+            <a:r>
+              <a:rPr lang="en-US" sz="1400" dirty="0" smtClean="0">
+                <a:solidFill>
+                  <a:srgbClr val="FF0000"/>
+                </a:solidFill>
+              </a:rPr>
+              <a:t>Distance to first voltage</a:t>
+            </a:r>
+          </a:p>
+          <a:p>
+            <a:r>
+              <a:rPr lang="en-US" sz="1400" dirty="0">
+                <a:solidFill>
+                  <a:srgbClr val="FF0000"/>
+                </a:solidFill>
+              </a:rPr>
+              <a:t>s</a:t>
+            </a:r>
+            <a:r>
+              <a:rPr lang="en-US" sz="1400" dirty="0" smtClean="0">
+                <a:solidFill>
+                  <a:srgbClr val="FF0000"/>
+                </a:solidFill>
+              </a:rPr>
+              <a:t>tanding wave maximum:</a:t>
+            </a:r>
+            <a:endParaRPr lang="en-US" sz="1400" dirty="0">
+              <a:solidFill>
+                <a:srgbClr val="FF0000"/>
+              </a:solidFill>
+            </a:endParaRPr>
+          </a:p>
+        </p:txBody>
+      </p:sp>
     </p:spTree>
     <p:extLst>
       <p:ext uri="{BB962C8B-B14F-4D97-AF65-F5344CB8AC3E}">
-        <p14:creationId xmlns:p14="http://schemas.microsoft.com/office/powerpoint/2010/main" val="352638237"/>
+        <p14:creationId xmlns:p14="http://schemas.microsoft.com/office/powerpoint/2010/main" val="593265578"/>
       </p:ext>
     </p:extLst>
   </p:cSld>
@@ -3723,7 +4444,7 @@
 </p:sld>
 </file>
 
-<file path=ppt/slides/slide3.xml><?xml version="1.0" encoding="utf-8"?>
+<file path=ppt/slides/slide2.xml><?xml version="1.0" encoding="utf-8"?>
 <p:sld xmlns:a="http://schemas.openxmlformats.org/drawingml/2006/main" xmlns:r="http://schemas.openxmlformats.org/officeDocument/2006/relationships" xmlns:p="http://schemas.openxmlformats.org/presentationml/2006/main">
   <p:cSld>
     <p:spTree>
@@ -3978,240 +4699,10 @@
           </a:p>
         </p:txBody>
       </p:sp>
-      <p:sp>
-        <p:nvSpPr>
-          <p:cNvPr id="12" name="TextBox 11"/>
-          <p:cNvSpPr txBox="1"/>
-          <p:nvPr/>
-        </p:nvSpPr>
-        <p:spPr>
-          <a:xfrm>
-            <a:off x="4778996" y="82115"/>
-            <a:ext cx="720607" cy="369332"/>
-          </a:xfrm>
-          <a:prstGeom prst="rect">
-            <a:avLst/>
-          </a:prstGeom>
-          <a:solidFill>
-            <a:srgbClr val="FFFFFF"/>
-          </a:solidFill>
-        </p:spPr>
-        <p:txBody>
-          <a:bodyPr wrap="none" rtlCol="0">
-            <a:spAutoFit/>
-          </a:bodyPr>
-          <a:lstStyle/>
-          <a:p>
-            <a:r>
-              <a:rPr lang="en-US" dirty="0" smtClean="0">
-                <a:solidFill>
-                  <a:srgbClr val="FF0000"/>
-                </a:solidFill>
-              </a:rPr>
-              <a:t>0.12</a:t>
-            </a:r>
-            <a:r>
-              <a:rPr lang="en-US" dirty="0" smtClean="0">
-                <a:solidFill>
-                  <a:srgbClr val="FF0000"/>
-                </a:solidFill>
-                <a:latin typeface="Symbol" charset="2"/>
-                <a:cs typeface="Symbol" charset="2"/>
-              </a:rPr>
-              <a:t>l</a:t>
-            </a:r>
-            <a:endParaRPr lang="en-US" dirty="0">
-              <a:solidFill>
-                <a:srgbClr val="FF0000"/>
-              </a:solidFill>
-            </a:endParaRPr>
-          </a:p>
-        </p:txBody>
-      </p:sp>
-      <p:cxnSp>
-        <p:nvCxnSpPr>
-          <p:cNvPr id="11" name="Straight Connector 10"/>
-          <p:cNvCxnSpPr/>
-          <p:nvPr/>
-        </p:nvCxnSpPr>
-        <p:spPr>
-          <a:xfrm flipH="1" flipV="1">
-            <a:off x="4548491" y="82115"/>
-            <a:ext cx="230507" cy="3399576"/>
-          </a:xfrm>
-          <a:prstGeom prst="line">
-            <a:avLst/>
-          </a:prstGeom>
-          <a:ln>
-            <a:solidFill>
-              <a:srgbClr val="FF0000"/>
-            </a:solidFill>
-            <a:prstDash val="sysDash"/>
-          </a:ln>
-          <a:effectLst/>
-        </p:spPr>
-        <p:style>
-          <a:lnRef idx="2">
-            <a:schemeClr val="accent1"/>
-          </a:lnRef>
-          <a:fillRef idx="0">
-            <a:schemeClr val="accent1"/>
-          </a:fillRef>
-          <a:effectRef idx="1">
-            <a:schemeClr val="accent1"/>
-          </a:effectRef>
-          <a:fontRef idx="minor">
-            <a:schemeClr val="tx1"/>
-          </a:fontRef>
-        </p:style>
-      </p:cxnSp>
-      <p:sp>
-        <p:nvSpPr>
-          <p:cNvPr id="15" name="TextBox 14"/>
-          <p:cNvSpPr txBox="1"/>
-          <p:nvPr/>
-        </p:nvSpPr>
-        <p:spPr>
-          <a:xfrm>
-            <a:off x="463775" y="2623580"/>
-            <a:ext cx="964289" cy="923330"/>
-          </a:xfrm>
-          <a:prstGeom prst="rect">
-            <a:avLst/>
-          </a:prstGeom>
-          <a:solidFill>
-            <a:srgbClr val="FFFFFF"/>
-          </a:solidFill>
-        </p:spPr>
-        <p:txBody>
-          <a:bodyPr wrap="none" rtlCol="0">
-            <a:spAutoFit/>
-          </a:bodyPr>
-          <a:lstStyle/>
-          <a:p>
-            <a:r>
-              <a:rPr lang="en-US" dirty="0" smtClean="0">
-                <a:solidFill>
-                  <a:srgbClr val="FF0000"/>
-                </a:solidFill>
-              </a:rPr>
-              <a:t>  0.12</a:t>
-            </a:r>
-            <a:r>
-              <a:rPr lang="en-US" dirty="0" smtClean="0">
-                <a:solidFill>
-                  <a:srgbClr val="FF0000"/>
-                </a:solidFill>
-                <a:latin typeface="Symbol" charset="2"/>
-                <a:cs typeface="Symbol" charset="2"/>
-              </a:rPr>
-              <a:t>l</a:t>
-            </a:r>
-            <a:br>
-              <a:rPr lang="en-US" dirty="0" smtClean="0">
-                <a:solidFill>
-                  <a:srgbClr val="FF0000"/>
-                </a:solidFill>
-                <a:latin typeface="Symbol" charset="2"/>
-                <a:cs typeface="Symbol" charset="2"/>
-              </a:rPr>
-            </a:br>
-            <a:r>
-              <a:rPr lang="en-US" dirty="0" smtClean="0">
-                <a:solidFill>
-                  <a:srgbClr val="FF0000"/>
-                </a:solidFill>
-              </a:rPr>
-              <a:t>+0.375</a:t>
-            </a:r>
-            <a:r>
-              <a:rPr lang="en-US" dirty="0" smtClean="0">
-                <a:solidFill>
-                  <a:srgbClr val="FF0000"/>
-                </a:solidFill>
-                <a:latin typeface="Symbol" charset="2"/>
-                <a:cs typeface="Symbol" charset="2"/>
-              </a:rPr>
-              <a:t>l</a:t>
-            </a:r>
-          </a:p>
-          <a:p>
-            <a:r>
-              <a:rPr lang="en-US" dirty="0" smtClean="0">
-                <a:solidFill>
-                  <a:srgbClr val="FF0000"/>
-                </a:solidFill>
-                <a:latin typeface="Symbol" charset="2"/>
-                <a:cs typeface="Symbol" charset="2"/>
-              </a:rPr>
-              <a:t>=</a:t>
-            </a:r>
-            <a:r>
-              <a:rPr lang="en-US" dirty="0" smtClean="0">
-                <a:solidFill>
-                  <a:srgbClr val="FF0000"/>
-                </a:solidFill>
-              </a:rPr>
-              <a:t>0.495</a:t>
-            </a:r>
-            <a:r>
-              <a:rPr lang="en-US" dirty="0" smtClean="0">
-                <a:solidFill>
-                  <a:srgbClr val="FF0000"/>
-                </a:solidFill>
-                <a:latin typeface="Symbol" charset="2"/>
-                <a:cs typeface="Symbol" charset="2"/>
-              </a:rPr>
-              <a:t>l</a:t>
-            </a:r>
-            <a:endParaRPr lang="en-US" dirty="0">
-              <a:solidFill>
-                <a:srgbClr val="FF0000"/>
-              </a:solidFill>
-            </a:endParaRPr>
-          </a:p>
-        </p:txBody>
-      </p:sp>
-      <p:cxnSp>
-        <p:nvCxnSpPr>
-          <p:cNvPr id="19" name="Straight Connector 18"/>
-          <p:cNvCxnSpPr/>
-          <p:nvPr/>
-        </p:nvCxnSpPr>
-        <p:spPr>
-          <a:xfrm>
-            <a:off x="535791" y="3241302"/>
-            <a:ext cx="767305" cy="0"/>
-          </a:xfrm>
-          <a:prstGeom prst="line">
-            <a:avLst/>
-          </a:prstGeom>
-          <a:ln>
-            <a:solidFill>
-              <a:srgbClr val="FF0000"/>
-            </a:solidFill>
-          </a:ln>
-          <a:effectLst/>
-        </p:spPr>
-        <p:style>
-          <a:lnRef idx="2">
-            <a:schemeClr val="accent1"/>
-          </a:lnRef>
-          <a:fillRef idx="0">
-            <a:schemeClr val="accent1"/>
-          </a:fillRef>
-          <a:effectRef idx="1">
-            <a:schemeClr val="accent1"/>
-          </a:effectRef>
-          <a:fontRef idx="minor">
-            <a:schemeClr val="tx1"/>
-          </a:fontRef>
-        </p:style>
-      </p:cxnSp>
     </p:spTree>
     <p:extLst>
       <p:ext uri="{BB962C8B-B14F-4D97-AF65-F5344CB8AC3E}">
-        <p14:creationId xmlns:p14="http://schemas.microsoft.com/office/powerpoint/2010/main" val="2910907446"/>
+        <p14:creationId xmlns:p14="http://schemas.microsoft.com/office/powerpoint/2010/main" val="1777618968"/>
       </p:ext>
     </p:extLst>
   </p:cSld>
@@ -4228,7 +4719,7 @@
 </p:sld>
 </file>
 
-<file path=ppt/slides/slide4.xml><?xml version="1.0" encoding="utf-8"?>
+<file path=ppt/slides/slide3.xml><?xml version="1.0" encoding="utf-8"?>
 <p:sld xmlns:a="http://schemas.openxmlformats.org/drawingml/2006/main" xmlns:r="http://schemas.openxmlformats.org/officeDocument/2006/relationships" xmlns:p="http://schemas.openxmlformats.org/presentationml/2006/main">
   <p:cSld>
     <p:spTree>
@@ -4483,56 +4974,6 @@
           </a:p>
         </p:txBody>
       </p:sp>
-      <p:sp>
-        <p:nvSpPr>
-          <p:cNvPr id="12" name="TextBox 11"/>
-          <p:cNvSpPr txBox="1"/>
-          <p:nvPr/>
-        </p:nvSpPr>
-        <p:spPr>
-          <a:xfrm>
-            <a:off x="4778996" y="82115"/>
-            <a:ext cx="720607" cy="369332"/>
-          </a:xfrm>
-          <a:prstGeom prst="rect">
-            <a:avLst/>
-          </a:prstGeom>
-          <a:solidFill>
-            <a:srgbClr val="FFFFFF"/>
-          </a:solidFill>
-        </p:spPr>
-        <p:txBody>
-          <a:bodyPr wrap="none" rtlCol="0">
-            <a:spAutoFit/>
-          </a:bodyPr>
-          <a:lstStyle/>
-          <a:p>
-            <a:r>
-              <a:rPr lang="en-US" dirty="0" smtClean="0">
-                <a:solidFill>
-                  <a:srgbClr val="FF0000"/>
-                </a:solidFill>
-              </a:rPr>
-              <a:t>0.12</a:t>
-            </a:r>
-            <a:r>
-              <a:rPr lang="en-US" dirty="0" smtClean="0">
-                <a:solidFill>
-                  <a:srgbClr val="FF0000"/>
-                </a:solidFill>
-                <a:latin typeface="Symbol" charset="2"/>
-                <a:cs typeface="Symbol" charset="2"/>
-              </a:rPr>
-              <a:t>l</a:t>
-            </a:r>
-            <a:endParaRPr lang="en-US" dirty="0">
-              <a:solidFill>
-                <a:srgbClr val="FF0000"/>
-              </a:solidFill>
-            </a:endParaRPr>
-          </a:p>
-        </p:txBody>
-      </p:sp>
       <p:cxnSp>
         <p:nvCxnSpPr>
           <p:cNvPr id="11" name="Straight Connector 10"/>
@@ -4572,14 +5013,14 @@
       </p:cxnSp>
       <p:sp>
         <p:nvSpPr>
-          <p:cNvPr id="15" name="TextBox 14"/>
+          <p:cNvPr id="12" name="TextBox 11"/>
           <p:cNvSpPr txBox="1"/>
           <p:nvPr/>
         </p:nvSpPr>
         <p:spPr>
           <a:xfrm>
-            <a:off x="463775" y="2623580"/>
-            <a:ext cx="964289" cy="923330"/>
+            <a:off x="4778996" y="82115"/>
+            <a:ext cx="720607" cy="369332"/>
           </a:xfrm>
           <a:prstGeom prst="rect">
             <a:avLst/>
@@ -4600,64 +5041,7 @@
                   <a:srgbClr val="FF0000"/>
                 </a:solidFill>
               </a:rPr>
-              <a:t>  0.12</a:t>
-            </a:r>
-            <a:r>
-              <a:rPr lang="en-US" dirty="0" smtClean="0">
-                <a:solidFill>
-                  <a:srgbClr val="FF0000"/>
-                </a:solidFill>
-                <a:latin typeface="Symbol" charset="2"/>
-                <a:cs typeface="Symbol" charset="2"/>
-              </a:rPr>
-              <a:t>l</a:t>
-            </a:r>
-            <a:br>
-              <a:rPr lang="en-US" dirty="0" smtClean="0">
-                <a:solidFill>
-                  <a:srgbClr val="FF0000"/>
-                </a:solidFill>
-                <a:latin typeface="Symbol" charset="2"/>
-                <a:cs typeface="Symbol" charset="2"/>
-              </a:rPr>
-            </a:br>
-            <a:r>
-              <a:rPr lang="en-US" dirty="0" smtClean="0">
-                <a:solidFill>
-                  <a:srgbClr val="FF0000"/>
-                </a:solidFill>
-              </a:rPr>
-              <a:t>+0.375</a:t>
-            </a:r>
-            <a:r>
-              <a:rPr lang="en-US" dirty="0" smtClean="0">
-                <a:solidFill>
-                  <a:srgbClr val="FF0000"/>
-                </a:solidFill>
-                <a:latin typeface="Symbol" charset="2"/>
-                <a:cs typeface="Symbol" charset="2"/>
-              </a:rPr>
-              <a:t>l</a:t>
-            </a:r>
-          </a:p>
-          <a:p>
-            <a:r>
-              <a:rPr lang="en-US" dirty="0" smtClean="0">
-                <a:solidFill>
-                  <a:srgbClr val="FF0000"/>
-                </a:solidFill>
-                <a:latin typeface="Symbol" charset="2"/>
-                <a:cs typeface="Symbol" charset="2"/>
-              </a:rPr>
-              <a:t>=</a:t>
-            </a:r>
-            <a:r>
-              <a:rPr lang="en-US" dirty="0" smtClean="0">
-                <a:solidFill>
-                  <a:srgbClr val="FF0000"/>
-                </a:solidFill>
-              </a:rPr>
-              <a:t>0.495</a:t>
+              <a:t>0.12</a:t>
             </a:r>
             <a:r>
               <a:rPr lang="en-US" dirty="0" smtClean="0">
@@ -4677,83 +5061,10 @@
           </a:p>
         </p:txBody>
       </p:sp>
-      <p:cxnSp>
-        <p:nvCxnSpPr>
-          <p:cNvPr id="16" name="Straight Connector 15"/>
-          <p:cNvCxnSpPr/>
-          <p:nvPr/>
-        </p:nvCxnSpPr>
-        <p:spPr>
-          <a:xfrm flipH="1">
-            <a:off x="1190647" y="3481691"/>
-            <a:ext cx="3588352" cy="229269"/>
-          </a:xfrm>
-          <a:prstGeom prst="line">
-            <a:avLst/>
-          </a:prstGeom>
-          <a:ln>
-            <a:solidFill>
-              <a:srgbClr val="FF0000"/>
-            </a:solidFill>
-            <a:prstDash val="sysDash"/>
-          </a:ln>
-          <a:effectLst/>
-        </p:spPr>
-        <p:style>
-          <a:lnRef idx="2">
-            <a:schemeClr val="accent1"/>
-          </a:lnRef>
-          <a:fillRef idx="0">
-            <a:schemeClr val="accent1"/>
-          </a:fillRef>
-          <a:effectRef idx="1">
-            <a:schemeClr val="accent1"/>
-          </a:effectRef>
-          <a:fontRef idx="minor">
-            <a:schemeClr val="tx1"/>
-          </a:fontRef>
-        </p:style>
-      </p:cxnSp>
-      <p:cxnSp>
-        <p:nvCxnSpPr>
-          <p:cNvPr id="19" name="Straight Connector 18"/>
-          <p:cNvCxnSpPr/>
-          <p:nvPr/>
-        </p:nvCxnSpPr>
-        <p:spPr>
-          <a:xfrm>
-            <a:off x="535791" y="3241302"/>
-            <a:ext cx="767305" cy="0"/>
-          </a:xfrm>
-          <a:prstGeom prst="line">
-            <a:avLst/>
-          </a:prstGeom>
-          <a:ln>
-            <a:solidFill>
-              <a:srgbClr val="FF0000"/>
-            </a:solidFill>
-          </a:ln>
-          <a:effectLst/>
-        </p:spPr>
-        <p:style>
-          <a:lnRef idx="2">
-            <a:schemeClr val="accent1"/>
-          </a:lnRef>
-          <a:fillRef idx="0">
-            <a:schemeClr val="accent1"/>
-          </a:fillRef>
-          <a:effectRef idx="1">
-            <a:schemeClr val="accent1"/>
-          </a:effectRef>
-          <a:fontRef idx="minor">
-            <a:schemeClr val="tx1"/>
-          </a:fontRef>
-        </p:style>
-      </p:cxnSp>
     </p:spTree>
     <p:extLst>
       <p:ext uri="{BB962C8B-B14F-4D97-AF65-F5344CB8AC3E}">
-        <p14:creationId xmlns:p14="http://schemas.microsoft.com/office/powerpoint/2010/main" val="299104698"/>
+        <p14:creationId xmlns:p14="http://schemas.microsoft.com/office/powerpoint/2010/main" val="352638237"/>
       </p:ext>
     </p:extLst>
   </p:cSld>
@@ -4770,7 +5081,7 @@
 </p:sld>
 </file>
 
-<file path=ppt/slides/slide5.xml><?xml version="1.0" encoding="utf-8"?>
+<file path=ppt/slides/slide4.xml><?xml version="1.0" encoding="utf-8"?>
 <p:sld xmlns:a="http://schemas.openxmlformats.org/drawingml/2006/main" xmlns:r="http://schemas.openxmlformats.org/officeDocument/2006/relationships" xmlns:p="http://schemas.openxmlformats.org/presentationml/2006/main">
   <p:cSld>
     <p:spTree>
@@ -5075,54 +5386,6 @@
           </a:p>
         </p:txBody>
       </p:sp>
-      <p:sp>
-        <p:nvSpPr>
-          <p:cNvPr id="13" name="Arc 12"/>
-          <p:cNvSpPr/>
-          <p:nvPr/>
-        </p:nvSpPr>
-        <p:spPr>
-          <a:xfrm>
-            <a:off x="3208131" y="1899196"/>
-            <a:ext cx="3143511" cy="3203342"/>
-          </a:xfrm>
-          <a:prstGeom prst="arc">
-            <a:avLst>
-              <a:gd name="adj1" fmla="val 15897266"/>
-              <a:gd name="adj2" fmla="val 10548614"/>
-            </a:avLst>
-          </a:prstGeom>
-          <a:noFill/>
-          <a:ln>
-            <a:solidFill>
-              <a:srgbClr val="FF0000"/>
-            </a:solidFill>
-          </a:ln>
-          <a:effectLst/>
-        </p:spPr>
-        <p:style>
-          <a:lnRef idx="2">
-            <a:schemeClr val="accent1"/>
-          </a:lnRef>
-          <a:fillRef idx="0">
-            <a:schemeClr val="accent1"/>
-          </a:fillRef>
-          <a:effectRef idx="1">
-            <a:schemeClr val="accent1"/>
-          </a:effectRef>
-          <a:fontRef idx="minor">
-            <a:schemeClr val="tx1"/>
-          </a:fontRef>
-        </p:style>
-        <p:txBody>
-          <a:bodyPr rtlCol="0" anchor="ctr"/>
-          <a:lstStyle/>
-          <a:p>
-            <a:pPr algn="ctr"/>
-            <a:endParaRPr lang="en-US"/>
-          </a:p>
-        </p:txBody>
-      </p:sp>
       <p:cxnSp>
         <p:nvCxnSpPr>
           <p:cNvPr id="11" name="Straight Connector 10"/>
@@ -5162,14 +5425,14 @@
       </p:cxnSp>
       <p:sp>
         <p:nvSpPr>
-          <p:cNvPr id="14" name="TextBox 13"/>
+          <p:cNvPr id="15" name="TextBox 14"/>
           <p:cNvSpPr txBox="1"/>
           <p:nvPr/>
         </p:nvSpPr>
         <p:spPr>
           <a:xfrm>
-            <a:off x="1960034" y="2992912"/>
-            <a:ext cx="1543136" cy="369332"/>
+            <a:off x="463775" y="2623580"/>
+            <a:ext cx="964289" cy="923330"/>
           </a:xfrm>
           <a:prstGeom prst="rect">
             <a:avLst/>
@@ -5185,234 +5448,85 @@
           <a:lstStyle/>
           <a:p>
             <a:r>
-              <a:rPr lang="en-US" dirty="0" err="1" smtClean="0">
-                <a:solidFill>
-                  <a:srgbClr val="FF0000"/>
-                </a:solidFill>
-              </a:rPr>
-              <a:t>z</a:t>
-            </a:r>
-            <a:r>
-              <a:rPr lang="en-US" baseline="-25000" dirty="0" err="1" smtClean="0">
-                <a:solidFill>
-                  <a:srgbClr val="FF0000"/>
-                </a:solidFill>
-              </a:rPr>
-              <a:t>in</a:t>
-            </a:r>
-            <a:r>
-              <a:rPr lang="en-US" dirty="0" smtClean="0">
-                <a:solidFill>
-                  <a:srgbClr val="FF0000"/>
-                </a:solidFill>
-              </a:rPr>
-              <a:t> = 0.3 </a:t>
-            </a:r>
-            <a:r>
-              <a:rPr lang="en-US" dirty="0">
-                <a:solidFill>
-                  <a:srgbClr val="FF0000"/>
-                </a:solidFill>
-              </a:rPr>
-              <a:t>-</a:t>
-            </a:r>
-            <a:r>
-              <a:rPr lang="en-US" dirty="0" smtClean="0">
-                <a:solidFill>
-                  <a:srgbClr val="FF0000"/>
-                </a:solidFill>
-              </a:rPr>
-              <a:t> j0.05</a:t>
+              <a:rPr lang="en-US" dirty="0" smtClean="0">
+                <a:solidFill>
+                  <a:srgbClr val="FF0000"/>
+                </a:solidFill>
+              </a:rPr>
+              <a:t>  0.12</a:t>
+            </a:r>
+            <a:r>
+              <a:rPr lang="en-US" dirty="0" smtClean="0">
+                <a:solidFill>
+                  <a:srgbClr val="FF0000"/>
+                </a:solidFill>
+                <a:latin typeface="Symbol" charset="2"/>
+                <a:cs typeface="Symbol" charset="2"/>
+              </a:rPr>
+              <a:t>l</a:t>
+            </a:r>
+            <a:br>
+              <a:rPr lang="en-US" dirty="0" smtClean="0">
+                <a:solidFill>
+                  <a:srgbClr val="FF0000"/>
+                </a:solidFill>
+                <a:latin typeface="Symbol" charset="2"/>
+                <a:cs typeface="Symbol" charset="2"/>
+              </a:rPr>
+            </a:br>
+            <a:r>
+              <a:rPr lang="en-US" dirty="0" smtClean="0">
+                <a:solidFill>
+                  <a:srgbClr val="FF0000"/>
+                </a:solidFill>
+              </a:rPr>
+              <a:t>+0.375</a:t>
+            </a:r>
+            <a:r>
+              <a:rPr lang="en-US" dirty="0" smtClean="0">
+                <a:solidFill>
+                  <a:srgbClr val="FF0000"/>
+                </a:solidFill>
+                <a:latin typeface="Symbol" charset="2"/>
+                <a:cs typeface="Symbol" charset="2"/>
+              </a:rPr>
+              <a:t>l</a:t>
+            </a:r>
+          </a:p>
+          <a:p>
+            <a:r>
+              <a:rPr lang="en-US" dirty="0" smtClean="0">
+                <a:solidFill>
+                  <a:srgbClr val="FF0000"/>
+                </a:solidFill>
+                <a:latin typeface="Symbol" charset="2"/>
+                <a:cs typeface="Symbol" charset="2"/>
+              </a:rPr>
+              <a:t>=</a:t>
+            </a:r>
+            <a:r>
+              <a:rPr lang="en-US" dirty="0" smtClean="0">
+                <a:solidFill>
+                  <a:srgbClr val="FF0000"/>
+                </a:solidFill>
+              </a:rPr>
+              <a:t>0.495</a:t>
+            </a:r>
+            <a:r>
+              <a:rPr lang="en-US" dirty="0" smtClean="0">
+                <a:solidFill>
+                  <a:srgbClr val="FF0000"/>
+                </a:solidFill>
+                <a:latin typeface="Symbol" charset="2"/>
+                <a:cs typeface="Symbol" charset="2"/>
+              </a:rPr>
+              <a:t>l</a:t>
             </a:r>
             <a:endParaRPr lang="en-US" dirty="0">
               <a:solidFill>
                 <a:srgbClr val="FF0000"/>
               </a:solidFill>
             </a:endParaRPr>
-          </a:p>
-        </p:txBody>
-      </p:sp>
-      <p:sp>
-        <p:nvSpPr>
-          <p:cNvPr id="15" name="TextBox 14"/>
-          <p:cNvSpPr txBox="1"/>
-          <p:nvPr/>
-        </p:nvSpPr>
-        <p:spPr>
-          <a:xfrm>
-            <a:off x="463775" y="2623580"/>
-            <a:ext cx="964289" cy="923330"/>
-          </a:xfrm>
-          <a:prstGeom prst="rect">
-            <a:avLst/>
-          </a:prstGeom>
-          <a:solidFill>
-            <a:srgbClr val="FFFFFF"/>
-          </a:solidFill>
-        </p:spPr>
-        <p:txBody>
-          <a:bodyPr wrap="none" rtlCol="0">
-            <a:spAutoFit/>
-          </a:bodyPr>
-          <a:lstStyle/>
-          <a:p>
-            <a:r>
-              <a:rPr lang="en-US" dirty="0" smtClean="0">
-                <a:solidFill>
-                  <a:srgbClr val="FF0000"/>
-                </a:solidFill>
-              </a:rPr>
-              <a:t>  0.12</a:t>
-            </a:r>
-            <a:r>
-              <a:rPr lang="en-US" dirty="0" smtClean="0">
-                <a:solidFill>
-                  <a:srgbClr val="FF0000"/>
-                </a:solidFill>
-                <a:latin typeface="Symbol" charset="2"/>
-                <a:cs typeface="Symbol" charset="2"/>
-              </a:rPr>
-              <a:t>l</a:t>
-            </a:r>
-          </a:p>
-          <a:p>
-            <a:r>
-              <a:rPr lang="en-US" dirty="0" smtClean="0">
-                <a:solidFill>
-                  <a:srgbClr val="FF0000"/>
-                </a:solidFill>
-              </a:rPr>
-              <a:t>+0.375</a:t>
-            </a:r>
-            <a:r>
-              <a:rPr lang="en-US" dirty="0" smtClean="0">
-                <a:solidFill>
-                  <a:srgbClr val="FF0000"/>
-                </a:solidFill>
-                <a:latin typeface="Symbol" charset="2"/>
-                <a:cs typeface="Symbol" charset="2"/>
-              </a:rPr>
-              <a:t>l</a:t>
-            </a:r>
-          </a:p>
-          <a:p>
-            <a:r>
-              <a:rPr lang="en-US" dirty="0" smtClean="0">
-                <a:solidFill>
-                  <a:srgbClr val="FF0000"/>
-                </a:solidFill>
-                <a:latin typeface="Symbol" charset="2"/>
-                <a:cs typeface="Symbol" charset="2"/>
-              </a:rPr>
-              <a:t>=</a:t>
-            </a:r>
-            <a:r>
-              <a:rPr lang="en-US" dirty="0" smtClean="0">
-                <a:solidFill>
-                  <a:srgbClr val="FF0000"/>
-                </a:solidFill>
-              </a:rPr>
-              <a:t>0.495</a:t>
-            </a:r>
-            <a:r>
-              <a:rPr lang="en-US" dirty="0" smtClean="0">
-                <a:solidFill>
-                  <a:srgbClr val="FF0000"/>
-                </a:solidFill>
-                <a:latin typeface="Symbol" charset="2"/>
-                <a:cs typeface="Symbol" charset="2"/>
-              </a:rPr>
-              <a:t>l</a:t>
-            </a:r>
-            <a:endParaRPr lang="en-US" dirty="0">
-              <a:solidFill>
-                <a:srgbClr val="FF0000"/>
-              </a:solidFill>
-            </a:endParaRPr>
-          </a:p>
-        </p:txBody>
-      </p:sp>
-      <p:cxnSp>
-        <p:nvCxnSpPr>
-          <p:cNvPr id="16" name="Straight Connector 15"/>
-          <p:cNvCxnSpPr/>
-          <p:nvPr/>
-        </p:nvCxnSpPr>
-        <p:spPr>
-          <a:xfrm flipH="1">
-            <a:off x="1190647" y="3481691"/>
-            <a:ext cx="3588352" cy="229269"/>
-          </a:xfrm>
-          <a:prstGeom prst="line">
-            <a:avLst/>
-          </a:prstGeom>
-          <a:ln>
-            <a:solidFill>
-              <a:srgbClr val="FF0000"/>
-            </a:solidFill>
-            <a:prstDash val="sysDash"/>
-          </a:ln>
-          <a:effectLst/>
-        </p:spPr>
-        <p:style>
-          <a:lnRef idx="2">
-            <a:schemeClr val="accent1"/>
-          </a:lnRef>
-          <a:fillRef idx="0">
-            <a:schemeClr val="accent1"/>
-          </a:fillRef>
-          <a:effectRef idx="1">
-            <a:schemeClr val="accent1"/>
-          </a:effectRef>
-          <a:fontRef idx="minor">
-            <a:schemeClr val="tx1"/>
-          </a:fontRef>
-        </p:style>
-      </p:cxnSp>
-      <p:sp>
-        <p:nvSpPr>
-          <p:cNvPr id="17" name="Oval 16"/>
-          <p:cNvSpPr/>
-          <p:nvPr/>
-        </p:nvSpPr>
-        <p:spPr>
-          <a:xfrm>
-            <a:off x="3164070" y="3521426"/>
-            <a:ext cx="88122" cy="88122"/>
-          </a:xfrm>
-          <a:prstGeom prst="ellipse">
-            <a:avLst/>
-          </a:prstGeom>
-          <a:solidFill>
-            <a:srgbClr val="FF0000"/>
-          </a:solidFill>
-          <a:ln>
-            <a:solidFill>
-              <a:schemeClr val="tx1"/>
-            </a:solidFill>
-          </a:ln>
-          <a:effectLst/>
-        </p:spPr>
-        <p:style>
-          <a:lnRef idx="1">
-            <a:schemeClr val="accent1"/>
-          </a:lnRef>
-          <a:fillRef idx="3">
-            <a:schemeClr val="accent1"/>
-          </a:fillRef>
-          <a:effectRef idx="2">
-            <a:schemeClr val="accent1"/>
-          </a:effectRef>
-          <a:fontRef idx="minor">
-            <a:schemeClr val="lt1"/>
-          </a:fontRef>
-        </p:style>
-        <p:txBody>
-          <a:bodyPr rtlCol="0" anchor="ctr"/>
-          <a:lstStyle/>
-          <a:p>
-            <a:pPr algn="ctr"/>
-            <a:endParaRPr lang="en-US"/>
           </a:p>
         </p:txBody>
       </p:sp>
@@ -5455,7 +5569,7 @@
     </p:spTree>
     <p:extLst>
       <p:ext uri="{BB962C8B-B14F-4D97-AF65-F5344CB8AC3E}">
-        <p14:creationId xmlns:p14="http://schemas.microsoft.com/office/powerpoint/2010/main" val="727092445"/>
+        <p14:creationId xmlns:p14="http://schemas.microsoft.com/office/powerpoint/2010/main" val="2910907446"/>
       </p:ext>
     </p:extLst>
   </p:cSld>
@@ -5472,7 +5586,7 @@
 </p:sld>
 </file>
 
-<file path=ppt/slides/slide6.xml><?xml version="1.0" encoding="utf-8"?>
+<file path=ppt/slides/slide5.xml><?xml version="1.0" encoding="utf-8"?>
 <p:sld xmlns:a="http://schemas.openxmlformats.org/drawingml/2006/main" xmlns:r="http://schemas.openxmlformats.org/officeDocument/2006/relationships" xmlns:p="http://schemas.openxmlformats.org/presentationml/2006/main">
   <p:cSld>
     <p:spTree>
@@ -5777,54 +5891,6 @@
           </a:p>
         </p:txBody>
       </p:sp>
-      <p:sp>
-        <p:nvSpPr>
-          <p:cNvPr id="13" name="Arc 12"/>
-          <p:cNvSpPr/>
-          <p:nvPr/>
-        </p:nvSpPr>
-        <p:spPr>
-          <a:xfrm>
-            <a:off x="3208131" y="1899196"/>
-            <a:ext cx="3143511" cy="3203342"/>
-          </a:xfrm>
-          <a:prstGeom prst="arc">
-            <a:avLst>
-              <a:gd name="adj1" fmla="val 15897266"/>
-              <a:gd name="adj2" fmla="val 10548614"/>
-            </a:avLst>
-          </a:prstGeom>
-          <a:noFill/>
-          <a:ln>
-            <a:solidFill>
-              <a:srgbClr val="FF0000"/>
-            </a:solidFill>
-          </a:ln>
-          <a:effectLst/>
-        </p:spPr>
-        <p:style>
-          <a:lnRef idx="2">
-            <a:schemeClr val="accent1"/>
-          </a:lnRef>
-          <a:fillRef idx="0">
-            <a:schemeClr val="accent1"/>
-          </a:fillRef>
-          <a:effectRef idx="1">
-            <a:schemeClr val="accent1"/>
-          </a:effectRef>
-          <a:fontRef idx="minor">
-            <a:schemeClr val="tx1"/>
-          </a:fontRef>
-        </p:style>
-        <p:txBody>
-          <a:bodyPr rtlCol="0" anchor="ctr"/>
-          <a:lstStyle/>
-          <a:p>
-            <a:pPr algn="ctr"/>
-            <a:endParaRPr lang="en-US"/>
-          </a:p>
-        </p:txBody>
-      </p:sp>
       <p:cxnSp>
         <p:nvCxnSpPr>
           <p:cNvPr id="11" name="Straight Connector 10"/>
@@ -5864,14 +5930,14 @@
       </p:cxnSp>
       <p:sp>
         <p:nvSpPr>
-          <p:cNvPr id="14" name="TextBox 13"/>
+          <p:cNvPr id="15" name="TextBox 14"/>
           <p:cNvSpPr txBox="1"/>
           <p:nvPr/>
         </p:nvSpPr>
         <p:spPr>
           <a:xfrm>
-            <a:off x="1960034" y="2992912"/>
-            <a:ext cx="1543136" cy="369332"/>
+            <a:off x="463775" y="2623580"/>
+            <a:ext cx="964289" cy="923330"/>
           </a:xfrm>
           <a:prstGeom prst="rect">
             <a:avLst/>
@@ -5887,78 +5953,6 @@
           <a:lstStyle/>
           <a:p>
             <a:r>
-              <a:rPr lang="en-US" dirty="0" err="1" smtClean="0">
-                <a:solidFill>
-                  <a:srgbClr val="FF0000"/>
-                </a:solidFill>
-              </a:rPr>
-              <a:t>z</a:t>
-            </a:r>
-            <a:r>
-              <a:rPr lang="en-US" baseline="-25000" dirty="0" err="1" smtClean="0">
-                <a:solidFill>
-                  <a:srgbClr val="FF0000"/>
-                </a:solidFill>
-              </a:rPr>
-              <a:t>in</a:t>
-            </a:r>
-            <a:r>
-              <a:rPr lang="en-US" dirty="0" smtClean="0">
-                <a:solidFill>
-                  <a:srgbClr val="FF0000"/>
-                </a:solidFill>
-              </a:rPr>
-              <a:t> = 0.3 </a:t>
-            </a:r>
-            <a:r>
-              <a:rPr lang="en-US" dirty="0">
-                <a:solidFill>
-                  <a:srgbClr val="FF0000"/>
-                </a:solidFill>
-              </a:rPr>
-              <a:t>-</a:t>
-            </a:r>
-            <a:r>
-              <a:rPr lang="en-US" dirty="0" smtClean="0">
-                <a:solidFill>
-                  <a:srgbClr val="FF0000"/>
-                </a:solidFill>
-              </a:rPr>
-              <a:t> j0.05</a:t>
-            </a:r>
-            <a:endParaRPr lang="en-US" dirty="0">
-              <a:solidFill>
-                <a:srgbClr val="FF0000"/>
-              </a:solidFill>
-            </a:endParaRPr>
-          </a:p>
-        </p:txBody>
-      </p:sp>
-      <p:sp>
-        <p:nvSpPr>
-          <p:cNvPr id="15" name="TextBox 14"/>
-          <p:cNvSpPr txBox="1"/>
-          <p:nvPr/>
-        </p:nvSpPr>
-        <p:spPr>
-          <a:xfrm>
-            <a:off x="463775" y="2623580"/>
-            <a:ext cx="964289" cy="923330"/>
-          </a:xfrm>
-          <a:prstGeom prst="rect">
-            <a:avLst/>
-          </a:prstGeom>
-          <a:solidFill>
-            <a:srgbClr val="FFFFFF"/>
-          </a:solidFill>
-        </p:spPr>
-        <p:txBody>
-          <a:bodyPr wrap="none" rtlCol="0">
-            <a:spAutoFit/>
-          </a:bodyPr>
-          <a:lstStyle/>
-          <a:p>
-            <a:r>
               <a:rPr lang="en-US" dirty="0" smtClean="0">
                 <a:solidFill>
                   <a:srgbClr val="FF0000"/>
@@ -5976,8 +5970,15 @@
               </a:rPr>
               <a:t>l</a:t>
             </a:r>
-          </a:p>
-          <a:p>
+            <a:br>
+              <a:rPr lang="en-US" dirty="0" smtClean="0">
+                <a:solidFill>
+                  <a:srgbClr val="FF0000"/>
+                </a:solidFill>
+                <a:latin typeface="Symbol" charset="2"/>
+                <a:cs typeface="Symbol" charset="2"/>
+              </a:rPr>
+            </a:br>
             <a:r>
               <a:rPr lang="en-US" dirty="0" smtClean="0">
                 <a:solidFill>
@@ -6071,53 +6072,6 @@
           </a:fontRef>
         </p:style>
       </p:cxnSp>
-      <p:sp>
-        <p:nvSpPr>
-          <p:cNvPr id="17" name="Oval 16"/>
-          <p:cNvSpPr/>
-          <p:nvPr/>
-        </p:nvSpPr>
-        <p:spPr>
-          <a:xfrm>
-            <a:off x="3164070" y="3521426"/>
-            <a:ext cx="88122" cy="88122"/>
-          </a:xfrm>
-          <a:prstGeom prst="ellipse">
-            <a:avLst/>
-          </a:prstGeom>
-          <a:solidFill>
-            <a:srgbClr val="FF0000"/>
-          </a:solidFill>
-          <a:ln>
-            <a:solidFill>
-              <a:schemeClr val="tx1"/>
-            </a:solidFill>
-          </a:ln>
-          <a:effectLst/>
-        </p:spPr>
-        <p:style>
-          <a:lnRef idx="1">
-            <a:schemeClr val="accent1"/>
-          </a:lnRef>
-          <a:fillRef idx="3">
-            <a:schemeClr val="accent1"/>
-          </a:fillRef>
-          <a:effectRef idx="2">
-            <a:schemeClr val="accent1"/>
-          </a:effectRef>
-          <a:fontRef idx="minor">
-            <a:schemeClr val="lt1"/>
-          </a:fontRef>
-        </p:style>
-        <p:txBody>
-          <a:bodyPr rtlCol="0" anchor="ctr"/>
-          <a:lstStyle/>
-          <a:p>
-            <a:pPr algn="ctr"/>
-            <a:endParaRPr lang="en-US"/>
-          </a:p>
-        </p:txBody>
-      </p:sp>
       <p:cxnSp>
         <p:nvCxnSpPr>
           <p:cNvPr id="19" name="Straight Connector 18"/>
@@ -6154,128 +6108,10 @@
           </a:fontRef>
         </p:style>
       </p:cxnSp>
-      <p:sp>
-        <p:nvSpPr>
-          <p:cNvPr id="18" name="TextBox 17"/>
-          <p:cNvSpPr txBox="1"/>
-          <p:nvPr/>
-        </p:nvSpPr>
-        <p:spPr>
-          <a:xfrm>
-            <a:off x="300365" y="5021407"/>
-            <a:ext cx="1710725" cy="646331"/>
-          </a:xfrm>
-          <a:prstGeom prst="rect">
-            <a:avLst/>
-          </a:prstGeom>
-          <a:solidFill>
-            <a:srgbClr val="FFFFFF"/>
-          </a:solidFill>
-        </p:spPr>
-        <p:txBody>
-          <a:bodyPr wrap="none" rtlCol="0">
-            <a:spAutoFit/>
-          </a:bodyPr>
-          <a:lstStyle/>
-          <a:p>
-            <a:r>
-              <a:rPr lang="en-US" dirty="0" err="1">
-                <a:solidFill>
-                  <a:srgbClr val="FF0000"/>
-                </a:solidFill>
-              </a:rPr>
-              <a:t>Z</a:t>
-            </a:r>
-            <a:r>
-              <a:rPr lang="en-US" baseline="-25000" dirty="0" err="1" smtClean="0">
-                <a:solidFill>
-                  <a:srgbClr val="FF0000"/>
-                </a:solidFill>
-              </a:rPr>
-              <a:t>in</a:t>
-            </a:r>
-            <a:r>
-              <a:rPr lang="en-US" dirty="0" smtClean="0">
-                <a:solidFill>
-                  <a:srgbClr val="FF0000"/>
-                </a:solidFill>
-              </a:rPr>
-              <a:t> = Z</a:t>
-            </a:r>
-            <a:r>
-              <a:rPr lang="en-US" baseline="-25000" dirty="0" smtClean="0">
-                <a:solidFill>
-                  <a:srgbClr val="FF0000"/>
-                </a:solidFill>
-              </a:rPr>
-              <a:t>0</a:t>
-            </a:r>
-            <a:r>
-              <a:rPr lang="en-US" dirty="0" smtClean="0">
-                <a:solidFill>
-                  <a:srgbClr val="FF0000"/>
-                </a:solidFill>
-              </a:rPr>
-              <a:t>z</a:t>
-            </a:r>
-            <a:r>
-              <a:rPr lang="en-US" baseline="-25000" dirty="0" smtClean="0">
-                <a:solidFill>
-                  <a:srgbClr val="FF0000"/>
-                </a:solidFill>
-              </a:rPr>
-              <a:t>in</a:t>
-            </a:r>
-          </a:p>
-          <a:p>
-            <a:r>
-              <a:rPr lang="en-US" dirty="0" smtClean="0">
-                <a:solidFill>
-                  <a:srgbClr val="FF0000"/>
-                </a:solidFill>
-              </a:rPr>
-              <a:t>     = 15 </a:t>
-            </a:r>
-            <a:r>
-              <a:rPr lang="en-US" dirty="0">
-                <a:solidFill>
-                  <a:srgbClr val="FF0000"/>
-                </a:solidFill>
-              </a:rPr>
-              <a:t>-</a:t>
-            </a:r>
-            <a:r>
-              <a:rPr lang="en-US" dirty="0" smtClean="0">
-                <a:solidFill>
-                  <a:srgbClr val="FF0000"/>
-                </a:solidFill>
-              </a:rPr>
-              <a:t> j0.25 </a:t>
-            </a:r>
-            <a:r>
-              <a:rPr lang="en-US" dirty="0" smtClean="0">
-                <a:solidFill>
-                  <a:srgbClr val="FF0000"/>
-                </a:solidFill>
-                <a:latin typeface="Symbol" charset="2"/>
-                <a:cs typeface="Symbol" charset="2"/>
-              </a:rPr>
-              <a:t>W</a:t>
-            </a:r>
-            <a:endParaRPr lang="en-US" dirty="0">
-              <a:solidFill>
-                <a:srgbClr val="FF0000"/>
-              </a:solidFill>
-              <a:latin typeface="Symbol" charset="2"/>
-              <a:cs typeface="Symbol" charset="2"/>
-            </a:endParaRPr>
-          </a:p>
-        </p:txBody>
-      </p:sp>
     </p:spTree>
     <p:extLst>
       <p:ext uri="{BB962C8B-B14F-4D97-AF65-F5344CB8AC3E}">
-        <p14:creationId xmlns:p14="http://schemas.microsoft.com/office/powerpoint/2010/main" val="1693046821"/>
+        <p14:creationId xmlns:p14="http://schemas.microsoft.com/office/powerpoint/2010/main" val="299104698"/>
       </p:ext>
     </p:extLst>
   </p:cSld>
@@ -6292,7 +6128,7 @@
 </p:sld>
 </file>
 
-<file path=ppt/slides/slide7.xml><?xml version="1.0" encoding="utf-8"?>
+<file path=ppt/slides/slide6.xml><?xml version="1.0" encoding="utf-8"?>
 <p:sld xmlns:a="http://schemas.openxmlformats.org/drawingml/2006/main" xmlns:r="http://schemas.openxmlformats.org/officeDocument/2006/relationships" xmlns:p="http://schemas.openxmlformats.org/presentationml/2006/main">
   <p:cSld>
     <p:spTree>
@@ -6974,215 +6810,10 @@
           </a:fontRef>
         </p:style>
       </p:cxnSp>
-      <p:sp>
-        <p:nvSpPr>
-          <p:cNvPr id="18" name="TextBox 17"/>
-          <p:cNvSpPr txBox="1"/>
-          <p:nvPr/>
-        </p:nvSpPr>
-        <p:spPr>
-          <a:xfrm>
-            <a:off x="300365" y="5021407"/>
-            <a:ext cx="1710725" cy="646331"/>
-          </a:xfrm>
-          <a:prstGeom prst="rect">
-            <a:avLst/>
-          </a:prstGeom>
-          <a:solidFill>
-            <a:srgbClr val="FFFFFF"/>
-          </a:solidFill>
-        </p:spPr>
-        <p:txBody>
-          <a:bodyPr wrap="none" rtlCol="0">
-            <a:spAutoFit/>
-          </a:bodyPr>
-          <a:lstStyle/>
-          <a:p>
-            <a:r>
-              <a:rPr lang="en-US" dirty="0" err="1">
-                <a:solidFill>
-                  <a:srgbClr val="FF0000"/>
-                </a:solidFill>
-              </a:rPr>
-              <a:t>Z</a:t>
-            </a:r>
-            <a:r>
-              <a:rPr lang="en-US" baseline="-25000" dirty="0" err="1" smtClean="0">
-                <a:solidFill>
-                  <a:srgbClr val="FF0000"/>
-                </a:solidFill>
-              </a:rPr>
-              <a:t>in</a:t>
-            </a:r>
-            <a:r>
-              <a:rPr lang="en-US" dirty="0" smtClean="0">
-                <a:solidFill>
-                  <a:srgbClr val="FF0000"/>
-                </a:solidFill>
-              </a:rPr>
-              <a:t> = Z</a:t>
-            </a:r>
-            <a:r>
-              <a:rPr lang="en-US" baseline="-25000" dirty="0" smtClean="0">
-                <a:solidFill>
-                  <a:srgbClr val="FF0000"/>
-                </a:solidFill>
-              </a:rPr>
-              <a:t>0</a:t>
-            </a:r>
-            <a:r>
-              <a:rPr lang="en-US" dirty="0" smtClean="0">
-                <a:solidFill>
-                  <a:srgbClr val="FF0000"/>
-                </a:solidFill>
-              </a:rPr>
-              <a:t>z</a:t>
-            </a:r>
-            <a:r>
-              <a:rPr lang="en-US" baseline="-25000" dirty="0" smtClean="0">
-                <a:solidFill>
-                  <a:srgbClr val="FF0000"/>
-                </a:solidFill>
-              </a:rPr>
-              <a:t>in</a:t>
-            </a:r>
-          </a:p>
-          <a:p>
-            <a:r>
-              <a:rPr lang="en-US" dirty="0" smtClean="0">
-                <a:solidFill>
-                  <a:srgbClr val="FF0000"/>
-                </a:solidFill>
-              </a:rPr>
-              <a:t>     = 15 </a:t>
-            </a:r>
-            <a:r>
-              <a:rPr lang="en-US" dirty="0">
-                <a:solidFill>
-                  <a:srgbClr val="FF0000"/>
-                </a:solidFill>
-              </a:rPr>
-              <a:t>-</a:t>
-            </a:r>
-            <a:r>
-              <a:rPr lang="en-US" dirty="0" smtClean="0">
-                <a:solidFill>
-                  <a:srgbClr val="FF0000"/>
-                </a:solidFill>
-              </a:rPr>
-              <a:t> j0.25 </a:t>
-            </a:r>
-            <a:r>
-              <a:rPr lang="en-US" dirty="0" smtClean="0">
-                <a:solidFill>
-                  <a:srgbClr val="FF0000"/>
-                </a:solidFill>
-                <a:latin typeface="Symbol" charset="2"/>
-                <a:cs typeface="Symbol" charset="2"/>
-              </a:rPr>
-              <a:t>W</a:t>
-            </a:r>
-            <a:endParaRPr lang="en-US" dirty="0">
-              <a:solidFill>
-                <a:srgbClr val="FF0000"/>
-              </a:solidFill>
-              <a:latin typeface="Symbol" charset="2"/>
-              <a:cs typeface="Symbol" charset="2"/>
-            </a:endParaRPr>
-          </a:p>
-        </p:txBody>
-      </p:sp>
-      <p:sp>
-        <p:nvSpPr>
-          <p:cNvPr id="20" name="TextBox 19"/>
-          <p:cNvSpPr txBox="1"/>
-          <p:nvPr/>
-        </p:nvSpPr>
-        <p:spPr>
-          <a:xfrm>
-            <a:off x="6415090" y="3601296"/>
-            <a:ext cx="1263988" cy="369332"/>
-          </a:xfrm>
-          <a:prstGeom prst="rect">
-            <a:avLst/>
-          </a:prstGeom>
-          <a:solidFill>
-            <a:srgbClr val="FFFFFF"/>
-          </a:solidFill>
-        </p:spPr>
-        <p:txBody>
-          <a:bodyPr wrap="none" rtlCol="0">
-            <a:spAutoFit/>
-          </a:bodyPr>
-          <a:lstStyle/>
-          <a:p>
-            <a:r>
-              <a:rPr lang="en-US" dirty="0" smtClean="0">
-                <a:solidFill>
-                  <a:srgbClr val="FF0000"/>
-                </a:solidFill>
-              </a:rPr>
-              <a:t>VSWR = 3.5</a:t>
-            </a:r>
-            <a:endParaRPr lang="en-US" dirty="0">
-              <a:solidFill>
-                <a:srgbClr val="FF0000"/>
-              </a:solidFill>
-            </a:endParaRPr>
-          </a:p>
-        </p:txBody>
-      </p:sp>
-      <p:sp>
-        <p:nvSpPr>
-          <p:cNvPr id="21" name="Oval 20"/>
-          <p:cNvSpPr/>
-          <p:nvPr/>
-        </p:nvSpPr>
-        <p:spPr>
-          <a:xfrm>
-            <a:off x="6304753" y="3433304"/>
-            <a:ext cx="88122" cy="88122"/>
-          </a:xfrm>
-          <a:prstGeom prst="ellipse">
-            <a:avLst/>
-          </a:prstGeom>
-          <a:solidFill>
-            <a:srgbClr val="FF0000"/>
-          </a:solidFill>
-          <a:ln>
-            <a:solidFill>
-              <a:schemeClr val="tx1"/>
-            </a:solidFill>
-          </a:ln>
-          <a:effectLst/>
-        </p:spPr>
-        <p:style>
-          <a:lnRef idx="1">
-            <a:schemeClr val="accent1"/>
-          </a:lnRef>
-          <a:fillRef idx="3">
-            <a:schemeClr val="accent1"/>
-          </a:fillRef>
-          <a:effectRef idx="2">
-            <a:schemeClr val="accent1"/>
-          </a:effectRef>
-          <a:fontRef idx="minor">
-            <a:schemeClr val="lt1"/>
-          </a:fontRef>
-        </p:style>
-        <p:txBody>
-          <a:bodyPr rtlCol="0" anchor="ctr"/>
-          <a:lstStyle/>
-          <a:p>
-            <a:pPr algn="ctr"/>
-            <a:endParaRPr lang="en-US"/>
-          </a:p>
-        </p:txBody>
-      </p:sp>
     </p:spTree>
     <p:extLst>
       <p:ext uri="{BB962C8B-B14F-4D97-AF65-F5344CB8AC3E}">
-        <p14:creationId xmlns:p14="http://schemas.microsoft.com/office/powerpoint/2010/main" val="101218846"/>
+        <p14:creationId xmlns:p14="http://schemas.microsoft.com/office/powerpoint/2010/main" val="727092445"/>
       </p:ext>
     </p:extLst>
   </p:cSld>
@@ -7199,7 +6830,7 @@
 </p:sld>
 </file>
 
-<file path=ppt/slides/slide8.xml><?xml version="1.0" encoding="utf-8"?>
+<file path=ppt/slides/slide7.xml><?xml version="1.0" encoding="utf-8"?>
 <p:sld xmlns:a="http://schemas.openxmlformats.org/drawingml/2006/main" xmlns:r="http://schemas.openxmlformats.org/officeDocument/2006/relationships" xmlns:p="http://schemas.openxmlformats.org/presentationml/2006/main">
   <p:cSld>
     <p:spTree>
@@ -7890,7 +7521,7 @@
         <p:spPr>
           <a:xfrm>
             <a:off x="300365" y="5021407"/>
-            <a:ext cx="1710725" cy="646331"/>
+            <a:ext cx="1643035" cy="646331"/>
           </a:xfrm>
           <a:prstGeom prst="rect">
             <a:avLst/>
@@ -7964,20 +7595,12 @@
               <a:t>     = 15 </a:t>
             </a:r>
             <a:r>
-              <a:rPr lang="en-US" dirty="0">
-                <a:solidFill>
-                  <a:srgbClr val="FF0000"/>
-                </a:solidFill>
-              </a:rPr>
-              <a:t>-</a:t>
-            </a:r>
-            <a:r>
-              <a:rPr lang="en-US" dirty="0" smtClean="0">
-                <a:solidFill>
-                  <a:srgbClr val="FF0000"/>
-                </a:solidFill>
-              </a:rPr>
-              <a:t> j0.25 </a:t>
+              <a:rPr lang="en-US" dirty="0" smtClean="0">
+                <a:solidFill>
+                  <a:srgbClr val="FF0000"/>
+                </a:solidFill>
+              </a:rPr>
+              <a:t>– j2.5 </a:t>
             </a:r>
             <a:r>
               <a:rPr lang="en-US" dirty="0" smtClean="0">
@@ -7999,184 +7622,10 @@
           </a:p>
         </p:txBody>
       </p:sp>
-      <p:sp>
-        <p:nvSpPr>
-          <p:cNvPr id="20" name="TextBox 19"/>
-          <p:cNvSpPr txBox="1"/>
-          <p:nvPr/>
-        </p:nvSpPr>
-        <p:spPr>
-          <a:xfrm>
-            <a:off x="6415090" y="3601296"/>
-            <a:ext cx="1263988" cy="369332"/>
-          </a:xfrm>
-          <a:prstGeom prst="rect">
-            <a:avLst/>
-          </a:prstGeom>
-          <a:solidFill>
-            <a:srgbClr val="FFFFFF"/>
-          </a:solidFill>
-        </p:spPr>
-        <p:txBody>
-          <a:bodyPr wrap="none" rtlCol="0">
-            <a:spAutoFit/>
-          </a:bodyPr>
-          <a:lstStyle/>
-          <a:p>
-            <a:r>
-              <a:rPr lang="en-US" dirty="0" smtClean="0">
-                <a:solidFill>
-                  <a:srgbClr val="FF0000"/>
-                </a:solidFill>
-              </a:rPr>
-              <a:t>VSWR = 3.5</a:t>
-            </a:r>
-            <a:endParaRPr lang="en-US" dirty="0">
-              <a:solidFill>
-                <a:srgbClr val="FF0000"/>
-              </a:solidFill>
-            </a:endParaRPr>
-          </a:p>
-        </p:txBody>
-      </p:sp>
-      <p:sp>
-        <p:nvSpPr>
-          <p:cNvPr id="21" name="Oval 20"/>
-          <p:cNvSpPr/>
-          <p:nvPr/>
-        </p:nvSpPr>
-        <p:spPr>
-          <a:xfrm>
-            <a:off x="6304753" y="3433304"/>
-            <a:ext cx="88122" cy="88122"/>
-          </a:xfrm>
-          <a:prstGeom prst="ellipse">
-            <a:avLst/>
-          </a:prstGeom>
-          <a:solidFill>
-            <a:srgbClr val="FF0000"/>
-          </a:solidFill>
-          <a:ln>
-            <a:solidFill>
-              <a:schemeClr val="tx1"/>
-            </a:solidFill>
-          </a:ln>
-          <a:effectLst/>
-        </p:spPr>
-        <p:style>
-          <a:lnRef idx="1">
-            <a:schemeClr val="accent1"/>
-          </a:lnRef>
-          <a:fillRef idx="3">
-            <a:schemeClr val="accent1"/>
-          </a:fillRef>
-          <a:effectRef idx="2">
-            <a:schemeClr val="accent1"/>
-          </a:effectRef>
-          <a:fontRef idx="minor">
-            <a:schemeClr val="lt1"/>
-          </a:fontRef>
-        </p:style>
-        <p:txBody>
-          <a:bodyPr rtlCol="0" anchor="ctr"/>
-          <a:lstStyle/>
-          <a:p>
-            <a:pPr algn="ctr"/>
-            <a:endParaRPr lang="en-US"/>
-          </a:p>
-        </p:txBody>
-      </p:sp>
-      <p:cxnSp>
-        <p:nvCxnSpPr>
-          <p:cNvPr id="25" name="Straight Connector 24"/>
-          <p:cNvCxnSpPr/>
-          <p:nvPr/>
-        </p:nvCxnSpPr>
-        <p:spPr>
-          <a:xfrm flipH="1">
-            <a:off x="4778999" y="3495178"/>
-            <a:ext cx="3804825" cy="0"/>
-          </a:xfrm>
-          <a:prstGeom prst="line">
-            <a:avLst/>
-          </a:prstGeom>
-          <a:ln>
-            <a:solidFill>
-              <a:srgbClr val="FF0000"/>
-            </a:solidFill>
-            <a:prstDash val="sysDash"/>
-          </a:ln>
-          <a:effectLst/>
-        </p:spPr>
-        <p:style>
-          <a:lnRef idx="2">
-            <a:schemeClr val="accent1"/>
-          </a:lnRef>
-          <a:fillRef idx="0">
-            <a:schemeClr val="accent1"/>
-          </a:fillRef>
-          <a:effectRef idx="1">
-            <a:schemeClr val="accent1"/>
-          </a:effectRef>
-          <a:fontRef idx="minor">
-            <a:schemeClr val="tx1"/>
-          </a:fontRef>
-        </p:style>
-      </p:cxnSp>
-      <p:sp>
-        <p:nvSpPr>
-          <p:cNvPr id="29" name="Arc 28"/>
-          <p:cNvSpPr/>
-          <p:nvPr/>
-        </p:nvSpPr>
-        <p:spPr>
-          <a:xfrm>
-            <a:off x="1303096" y="82115"/>
-            <a:ext cx="7014312" cy="6855257"/>
-          </a:xfrm>
-          <a:prstGeom prst="arc">
-            <a:avLst>
-              <a:gd name="adj1" fmla="val 15943104"/>
-              <a:gd name="adj2" fmla="val 0"/>
-            </a:avLst>
-          </a:prstGeom>
-          <a:ln w="12700" cmpd="sng">
-            <a:solidFill>
-              <a:srgbClr val="FF0000"/>
-            </a:solidFill>
-            <a:prstDash val="sysDash"/>
-            <a:headEnd type="none"/>
-            <a:tailEnd type="triangle"/>
-          </a:ln>
-          <a:effectLst/>
-        </p:spPr>
-        <p:style>
-          <a:lnRef idx="2">
-            <a:schemeClr val="accent1"/>
-          </a:lnRef>
-          <a:fillRef idx="0">
-            <a:schemeClr val="accent1"/>
-          </a:fillRef>
-          <a:effectRef idx="1">
-            <a:schemeClr val="accent1"/>
-          </a:effectRef>
-          <a:fontRef idx="minor">
-            <a:schemeClr val="tx1"/>
-          </a:fontRef>
-        </p:style>
-        <p:txBody>
-          <a:bodyPr rtlCol="0" anchor="ctr"/>
-          <a:lstStyle/>
-          <a:p>
-            <a:pPr algn="ctr"/>
-            <a:endParaRPr lang="en-US"/>
-          </a:p>
-        </p:txBody>
-      </p:sp>
     </p:spTree>
     <p:extLst>
       <p:ext uri="{BB962C8B-B14F-4D97-AF65-F5344CB8AC3E}">
-        <p14:creationId xmlns:p14="http://schemas.microsoft.com/office/powerpoint/2010/main" val="4152098040"/>
+        <p14:creationId xmlns:p14="http://schemas.microsoft.com/office/powerpoint/2010/main" val="1693046821"/>
       </p:ext>
     </p:extLst>
   </p:cSld>
@@ -8193,7 +7642,7 @@
 </p:sld>
 </file>
 
-<file path=ppt/slides/slide9.xml><?xml version="1.0" encoding="utf-8"?>
+<file path=ppt/slides/slide8.xml><?xml version="1.0" encoding="utf-8"?>
 <p:sld xmlns:a="http://schemas.openxmlformats.org/drawingml/2006/main" xmlns:r="http://schemas.openxmlformats.org/officeDocument/2006/relationships" xmlns:p="http://schemas.openxmlformats.org/presentationml/2006/main">
   <p:cSld>
     <p:spTree>
@@ -8884,7 +8333,7 @@
         <p:spPr>
           <a:xfrm>
             <a:off x="300365" y="5021407"/>
-            <a:ext cx="1710725" cy="646331"/>
+            <a:ext cx="1643035" cy="646331"/>
           </a:xfrm>
           <a:prstGeom prst="rect">
             <a:avLst/>
@@ -8958,6 +8407,579 @@
               <a:t>     = 15 </a:t>
             </a:r>
             <a:r>
+              <a:rPr lang="en-US" dirty="0" smtClean="0">
+                <a:solidFill>
+                  <a:srgbClr val="FF0000"/>
+                </a:solidFill>
+              </a:rPr>
+              <a:t>– j2.5 </a:t>
+            </a:r>
+            <a:r>
+              <a:rPr lang="en-US" dirty="0" smtClean="0">
+                <a:solidFill>
+                  <a:srgbClr val="FF0000"/>
+                </a:solidFill>
+                <a:latin typeface="Symbol" charset="2"/>
+                <a:cs typeface="Symbol" charset="2"/>
+              </a:rPr>
+              <a:t>W</a:t>
+            </a:r>
+            <a:endParaRPr lang="en-US" dirty="0">
+              <a:solidFill>
+                <a:srgbClr val="FF0000"/>
+              </a:solidFill>
+              <a:latin typeface="Symbol" charset="2"/>
+              <a:cs typeface="Symbol" charset="2"/>
+            </a:endParaRPr>
+          </a:p>
+        </p:txBody>
+      </p:sp>
+      <p:sp>
+        <p:nvSpPr>
+          <p:cNvPr id="20" name="TextBox 19"/>
+          <p:cNvSpPr txBox="1"/>
+          <p:nvPr/>
+        </p:nvSpPr>
+        <p:spPr>
+          <a:xfrm>
+            <a:off x="6415090" y="3601296"/>
+            <a:ext cx="1263988" cy="369332"/>
+          </a:xfrm>
+          <a:prstGeom prst="rect">
+            <a:avLst/>
+          </a:prstGeom>
+          <a:solidFill>
+            <a:srgbClr val="FFFFFF"/>
+          </a:solidFill>
+        </p:spPr>
+        <p:txBody>
+          <a:bodyPr wrap="none" rtlCol="0">
+            <a:spAutoFit/>
+          </a:bodyPr>
+          <a:lstStyle/>
+          <a:p>
+            <a:r>
+              <a:rPr lang="en-US" dirty="0" smtClean="0">
+                <a:solidFill>
+                  <a:srgbClr val="FF0000"/>
+                </a:solidFill>
+              </a:rPr>
+              <a:t>VSWR = 3.5</a:t>
+            </a:r>
+            <a:endParaRPr lang="en-US" dirty="0">
+              <a:solidFill>
+                <a:srgbClr val="FF0000"/>
+              </a:solidFill>
+            </a:endParaRPr>
+          </a:p>
+        </p:txBody>
+      </p:sp>
+      <p:sp>
+        <p:nvSpPr>
+          <p:cNvPr id="21" name="Oval 20"/>
+          <p:cNvSpPr/>
+          <p:nvPr/>
+        </p:nvSpPr>
+        <p:spPr>
+          <a:xfrm>
+            <a:off x="6304753" y="3433304"/>
+            <a:ext cx="88122" cy="88122"/>
+          </a:xfrm>
+          <a:prstGeom prst="ellipse">
+            <a:avLst/>
+          </a:prstGeom>
+          <a:solidFill>
+            <a:srgbClr val="FF0000"/>
+          </a:solidFill>
+          <a:ln>
+            <a:solidFill>
+              <a:schemeClr val="tx1"/>
+            </a:solidFill>
+          </a:ln>
+          <a:effectLst/>
+        </p:spPr>
+        <p:style>
+          <a:lnRef idx="1">
+            <a:schemeClr val="accent1"/>
+          </a:lnRef>
+          <a:fillRef idx="3">
+            <a:schemeClr val="accent1"/>
+          </a:fillRef>
+          <a:effectRef idx="2">
+            <a:schemeClr val="accent1"/>
+          </a:effectRef>
+          <a:fontRef idx="minor">
+            <a:schemeClr val="lt1"/>
+          </a:fontRef>
+        </p:style>
+        <p:txBody>
+          <a:bodyPr rtlCol="0" anchor="ctr"/>
+          <a:lstStyle/>
+          <a:p>
+            <a:pPr algn="ctr"/>
+            <a:endParaRPr lang="en-US"/>
+          </a:p>
+        </p:txBody>
+      </p:sp>
+    </p:spTree>
+    <p:extLst>
+      <p:ext uri="{BB962C8B-B14F-4D97-AF65-F5344CB8AC3E}">
+        <p14:creationId xmlns:p14="http://schemas.microsoft.com/office/powerpoint/2010/main" val="101218846"/>
+      </p:ext>
+    </p:extLst>
+  </p:cSld>
+  <p:clrMapOvr>
+    <a:masterClrMapping/>
+  </p:clrMapOvr>
+  <p:timing>
+    <p:tnLst>
+      <p:par>
+        <p:cTn xmlns:p14="http://schemas.microsoft.com/office/powerpoint/2010/main" id="1" dur="indefinite" restart="never" nodeType="tmRoot"/>
+      </p:par>
+    </p:tnLst>
+  </p:timing>
+</p:sld>
+</file>
+
+<file path=ppt/slides/slide9.xml><?xml version="1.0" encoding="utf-8"?>
+<p:sld xmlns:a="http://schemas.openxmlformats.org/drawingml/2006/main" xmlns:r="http://schemas.openxmlformats.org/officeDocument/2006/relationships" xmlns:p="http://schemas.openxmlformats.org/presentationml/2006/main">
+  <p:cSld>
+    <p:spTree>
+      <p:nvGrpSpPr>
+        <p:cNvPr id="1" name=""/>
+        <p:cNvGrpSpPr/>
+        <p:nvPr/>
+      </p:nvGrpSpPr>
+      <p:grpSpPr>
+        <a:xfrm>
+          <a:off x="0" y="0"/>
+          <a:ext cx="0" cy="0"/>
+          <a:chOff x="0" y="0"/>
+          <a:chExt cx="0" cy="0"/>
+        </a:xfrm>
+      </p:grpSpPr>
+      <p:grpSp>
+        <p:nvGrpSpPr>
+          <p:cNvPr id="8" name="Group 7"/>
+          <p:cNvGrpSpPr/>
+          <p:nvPr/>
+        </p:nvGrpSpPr>
+        <p:grpSpPr>
+          <a:xfrm>
+            <a:off x="1071933" y="-970415"/>
+            <a:ext cx="7419110" cy="9601200"/>
+            <a:chOff x="1071933" y="-970415"/>
+            <a:chExt cx="7419110" cy="9601200"/>
+          </a:xfrm>
+        </p:grpSpPr>
+        <p:pic>
+          <p:nvPicPr>
+            <p:cNvPr id="4" name="Picture 3" descr="SmithChart.pdf"/>
+            <p:cNvPicPr>
+              <a:picLocks noChangeAspect="1"/>
+            </p:cNvPicPr>
+            <p:nvPr/>
+          </p:nvPicPr>
+          <p:blipFill>
+            <a:blip r:embed="rId2">
+              <a:extLst>
+                <a:ext uri="{28A0092B-C50C-407E-A947-70E740481C1C}">
+                  <a14:useLocalDpi xmlns:a14="http://schemas.microsoft.com/office/drawing/2010/main" val="0"/>
+                </a:ext>
+              </a:extLst>
+            </a:blip>
+            <a:stretch>
+              <a:fillRect/>
+            </a:stretch>
+          </p:blipFill>
+          <p:spPr>
+            <a:xfrm>
+              <a:off x="1071933" y="-970415"/>
+              <a:ext cx="7419110" cy="9601200"/>
+            </a:xfrm>
+            <a:prstGeom prst="rect">
+              <a:avLst/>
+            </a:prstGeom>
+          </p:spPr>
+        </p:pic>
+        <p:sp>
+          <p:nvSpPr>
+            <p:cNvPr id="5" name="Rectangle 4"/>
+            <p:cNvSpPr/>
+            <p:nvPr/>
+          </p:nvSpPr>
+          <p:spPr>
+            <a:xfrm>
+              <a:off x="7585201" y="5206073"/>
+              <a:ext cx="732207" cy="1663369"/>
+            </a:xfrm>
+            <a:prstGeom prst="rect">
+              <a:avLst/>
+            </a:prstGeom>
+            <a:solidFill>
+              <a:schemeClr val="bg1"/>
+            </a:solidFill>
+            <a:ln>
+              <a:noFill/>
+            </a:ln>
+            <a:effectLst/>
+          </p:spPr>
+          <p:style>
+            <a:lnRef idx="1">
+              <a:schemeClr val="accent1"/>
+            </a:lnRef>
+            <a:fillRef idx="3">
+              <a:schemeClr val="accent1"/>
+            </a:fillRef>
+            <a:effectRef idx="2">
+              <a:schemeClr val="accent1"/>
+            </a:effectRef>
+            <a:fontRef idx="minor">
+              <a:schemeClr val="lt1"/>
+            </a:fontRef>
+          </p:style>
+          <p:txBody>
+            <a:bodyPr rtlCol="0" anchor="ctr"/>
+            <a:lstStyle/>
+            <a:p>
+              <a:pPr algn="ctr"/>
+              <a:endParaRPr lang="en-US"/>
+            </a:p>
+          </p:txBody>
+        </p:sp>
+        <p:sp>
+          <p:nvSpPr>
+            <p:cNvPr id="6" name="Rectangle 5"/>
+            <p:cNvSpPr/>
+            <p:nvPr/>
+          </p:nvSpPr>
+          <p:spPr>
+            <a:xfrm>
+              <a:off x="1071933" y="5206073"/>
+              <a:ext cx="888101" cy="1663369"/>
+            </a:xfrm>
+            <a:prstGeom prst="rect">
+              <a:avLst/>
+            </a:prstGeom>
+            <a:solidFill>
+              <a:schemeClr val="bg1"/>
+            </a:solidFill>
+            <a:ln>
+              <a:noFill/>
+            </a:ln>
+            <a:effectLst/>
+          </p:spPr>
+          <p:style>
+            <a:lnRef idx="1">
+              <a:schemeClr val="accent1"/>
+            </a:lnRef>
+            <a:fillRef idx="3">
+              <a:schemeClr val="accent1"/>
+            </a:fillRef>
+            <a:effectRef idx="2">
+              <a:schemeClr val="accent1"/>
+            </a:effectRef>
+            <a:fontRef idx="minor">
+              <a:schemeClr val="lt1"/>
+            </a:fontRef>
+          </p:style>
+          <p:txBody>
+            <a:bodyPr rtlCol="0" anchor="ctr"/>
+            <a:lstStyle/>
+            <a:p>
+              <a:pPr algn="ctr"/>
+              <a:endParaRPr lang="en-US"/>
+            </a:p>
+          </p:txBody>
+        </p:sp>
+      </p:grpSp>
+      <p:sp>
+        <p:nvSpPr>
+          <p:cNvPr id="9" name="Oval 8"/>
+          <p:cNvSpPr/>
+          <p:nvPr/>
+        </p:nvSpPr>
+        <p:spPr>
+          <a:xfrm>
+            <a:off x="4622829" y="1866121"/>
+            <a:ext cx="88122" cy="88122"/>
+          </a:xfrm>
+          <a:prstGeom prst="ellipse">
+            <a:avLst/>
+          </a:prstGeom>
+          <a:solidFill>
+            <a:srgbClr val="FF0000"/>
+          </a:solidFill>
+          <a:ln>
+            <a:solidFill>
+              <a:schemeClr val="tx1"/>
+            </a:solidFill>
+          </a:ln>
+          <a:effectLst/>
+        </p:spPr>
+        <p:style>
+          <a:lnRef idx="1">
+            <a:schemeClr val="accent1"/>
+          </a:lnRef>
+          <a:fillRef idx="3">
+            <a:schemeClr val="accent1"/>
+          </a:fillRef>
+          <a:effectRef idx="2">
+            <a:schemeClr val="accent1"/>
+          </a:effectRef>
+          <a:fontRef idx="minor">
+            <a:schemeClr val="lt1"/>
+          </a:fontRef>
+        </p:style>
+        <p:txBody>
+          <a:bodyPr rtlCol="0" anchor="ctr"/>
+          <a:lstStyle/>
+          <a:p>
+            <a:pPr algn="ctr"/>
+            <a:endParaRPr lang="en-US"/>
+          </a:p>
+        </p:txBody>
+      </p:sp>
+      <p:sp>
+        <p:nvSpPr>
+          <p:cNvPr id="10" name="TextBox 9"/>
+          <p:cNvSpPr txBox="1"/>
+          <p:nvPr/>
+        </p:nvSpPr>
+        <p:spPr>
+          <a:xfrm>
+            <a:off x="3094247" y="1709363"/>
+            <a:ext cx="1454244" cy="369332"/>
+          </a:xfrm>
+          <a:prstGeom prst="rect">
+            <a:avLst/>
+          </a:prstGeom>
+          <a:solidFill>
+            <a:srgbClr val="FFFFFF"/>
+          </a:solidFill>
+        </p:spPr>
+        <p:txBody>
+          <a:bodyPr wrap="none" rtlCol="0">
+            <a:spAutoFit/>
+          </a:bodyPr>
+          <a:lstStyle/>
+          <a:p>
+            <a:r>
+              <a:rPr lang="en-US" dirty="0" err="1" smtClean="0">
+                <a:solidFill>
+                  <a:srgbClr val="FF0000"/>
+                </a:solidFill>
+              </a:rPr>
+              <a:t>z</a:t>
+            </a:r>
+            <a:r>
+              <a:rPr lang="en-US" baseline="-25000" dirty="0" err="1" smtClean="0">
+                <a:solidFill>
+                  <a:srgbClr val="FF0000"/>
+                </a:solidFill>
+              </a:rPr>
+              <a:t>L</a:t>
+            </a:r>
+            <a:r>
+              <a:rPr lang="en-US" dirty="0" smtClean="0">
+                <a:solidFill>
+                  <a:srgbClr val="FF0000"/>
+                </a:solidFill>
+              </a:rPr>
+              <a:t> = 0.5 + j0.8</a:t>
+            </a:r>
+            <a:endParaRPr lang="en-US" dirty="0">
+              <a:solidFill>
+                <a:srgbClr val="FF0000"/>
+              </a:solidFill>
+            </a:endParaRPr>
+          </a:p>
+        </p:txBody>
+      </p:sp>
+      <p:sp>
+        <p:nvSpPr>
+          <p:cNvPr id="12" name="TextBox 11"/>
+          <p:cNvSpPr txBox="1"/>
+          <p:nvPr/>
+        </p:nvSpPr>
+        <p:spPr>
+          <a:xfrm>
+            <a:off x="4778996" y="82115"/>
+            <a:ext cx="720607" cy="369332"/>
+          </a:xfrm>
+          <a:prstGeom prst="rect">
+            <a:avLst/>
+          </a:prstGeom>
+          <a:solidFill>
+            <a:srgbClr val="FFFFFF"/>
+          </a:solidFill>
+        </p:spPr>
+        <p:txBody>
+          <a:bodyPr wrap="none" rtlCol="0">
+            <a:spAutoFit/>
+          </a:bodyPr>
+          <a:lstStyle/>
+          <a:p>
+            <a:r>
+              <a:rPr lang="en-US" dirty="0" smtClean="0">
+                <a:solidFill>
+                  <a:srgbClr val="FF0000"/>
+                </a:solidFill>
+              </a:rPr>
+              <a:t>0.12</a:t>
+            </a:r>
+            <a:r>
+              <a:rPr lang="en-US" dirty="0" smtClean="0">
+                <a:solidFill>
+                  <a:srgbClr val="FF0000"/>
+                </a:solidFill>
+                <a:latin typeface="Symbol" charset="2"/>
+                <a:cs typeface="Symbol" charset="2"/>
+              </a:rPr>
+              <a:t>l</a:t>
+            </a:r>
+            <a:endParaRPr lang="en-US" dirty="0">
+              <a:solidFill>
+                <a:srgbClr val="FF0000"/>
+              </a:solidFill>
+            </a:endParaRPr>
+          </a:p>
+        </p:txBody>
+      </p:sp>
+      <p:sp>
+        <p:nvSpPr>
+          <p:cNvPr id="13" name="Arc 12"/>
+          <p:cNvSpPr/>
+          <p:nvPr/>
+        </p:nvSpPr>
+        <p:spPr>
+          <a:xfrm>
+            <a:off x="3208131" y="1899196"/>
+            <a:ext cx="3143511" cy="3203342"/>
+          </a:xfrm>
+          <a:prstGeom prst="arc">
+            <a:avLst>
+              <a:gd name="adj1" fmla="val 15897266"/>
+              <a:gd name="adj2" fmla="val 10548614"/>
+            </a:avLst>
+          </a:prstGeom>
+          <a:noFill/>
+          <a:ln>
+            <a:solidFill>
+              <a:srgbClr val="FF0000"/>
+            </a:solidFill>
+          </a:ln>
+          <a:effectLst/>
+        </p:spPr>
+        <p:style>
+          <a:lnRef idx="2">
+            <a:schemeClr val="accent1"/>
+          </a:lnRef>
+          <a:fillRef idx="0">
+            <a:schemeClr val="accent1"/>
+          </a:fillRef>
+          <a:effectRef idx="1">
+            <a:schemeClr val="accent1"/>
+          </a:effectRef>
+          <a:fontRef idx="minor">
+            <a:schemeClr val="tx1"/>
+          </a:fontRef>
+        </p:style>
+        <p:txBody>
+          <a:bodyPr rtlCol="0" anchor="ctr"/>
+          <a:lstStyle/>
+          <a:p>
+            <a:pPr algn="ctr"/>
+            <a:endParaRPr lang="en-US"/>
+          </a:p>
+        </p:txBody>
+      </p:sp>
+      <p:cxnSp>
+        <p:nvCxnSpPr>
+          <p:cNvPr id="11" name="Straight Connector 10"/>
+          <p:cNvCxnSpPr/>
+          <p:nvPr/>
+        </p:nvCxnSpPr>
+        <p:spPr>
+          <a:xfrm flipH="1" flipV="1">
+            <a:off x="4548491" y="82115"/>
+            <a:ext cx="230507" cy="3399576"/>
+          </a:xfrm>
+          <a:prstGeom prst="line">
+            <a:avLst/>
+          </a:prstGeom>
+          <a:ln>
+            <a:solidFill>
+              <a:srgbClr val="FF0000"/>
+            </a:solidFill>
+            <a:prstDash val="sysDash"/>
+          </a:ln>
+          <a:effectLst/>
+        </p:spPr>
+        <p:style>
+          <a:lnRef idx="2">
+            <a:schemeClr val="accent1"/>
+          </a:lnRef>
+          <a:fillRef idx="0">
+            <a:schemeClr val="accent1"/>
+          </a:fillRef>
+          <a:effectRef idx="1">
+            <a:schemeClr val="accent1"/>
+          </a:effectRef>
+          <a:fontRef idx="minor">
+            <a:schemeClr val="tx1"/>
+          </a:fontRef>
+        </p:style>
+      </p:cxnSp>
+      <p:sp>
+        <p:nvSpPr>
+          <p:cNvPr id="14" name="TextBox 13"/>
+          <p:cNvSpPr txBox="1"/>
+          <p:nvPr/>
+        </p:nvSpPr>
+        <p:spPr>
+          <a:xfrm>
+            <a:off x="1960034" y="2992912"/>
+            <a:ext cx="1543136" cy="369332"/>
+          </a:xfrm>
+          <a:prstGeom prst="rect">
+            <a:avLst/>
+          </a:prstGeom>
+          <a:solidFill>
+            <a:srgbClr val="FFFFFF"/>
+          </a:solidFill>
+        </p:spPr>
+        <p:txBody>
+          <a:bodyPr wrap="none" rtlCol="0">
+            <a:spAutoFit/>
+          </a:bodyPr>
+          <a:lstStyle/>
+          <a:p>
+            <a:r>
+              <a:rPr lang="en-US" dirty="0" err="1" smtClean="0">
+                <a:solidFill>
+                  <a:srgbClr val="FF0000"/>
+                </a:solidFill>
+              </a:rPr>
+              <a:t>z</a:t>
+            </a:r>
+            <a:r>
+              <a:rPr lang="en-US" baseline="-25000" dirty="0" err="1" smtClean="0">
+                <a:solidFill>
+                  <a:srgbClr val="FF0000"/>
+                </a:solidFill>
+              </a:rPr>
+              <a:t>in</a:t>
+            </a:r>
+            <a:r>
+              <a:rPr lang="en-US" dirty="0" smtClean="0">
+                <a:solidFill>
+                  <a:srgbClr val="FF0000"/>
+                </a:solidFill>
+              </a:rPr>
+              <a:t> = 0.3 </a:t>
+            </a:r>
+            <a:r>
               <a:rPr lang="en-US" dirty="0">
                 <a:solidFill>
                   <a:srgbClr val="FF0000"/>
@@ -8971,7 +8993,325 @@
                   <a:srgbClr val="FF0000"/>
                 </a:solidFill>
               </a:rPr>
-              <a:t> j0.25 </a:t>
+              <a:t> j0.05</a:t>
+            </a:r>
+            <a:endParaRPr lang="en-US" dirty="0">
+              <a:solidFill>
+                <a:srgbClr val="FF0000"/>
+              </a:solidFill>
+            </a:endParaRPr>
+          </a:p>
+        </p:txBody>
+      </p:sp>
+      <p:sp>
+        <p:nvSpPr>
+          <p:cNvPr id="15" name="TextBox 14"/>
+          <p:cNvSpPr txBox="1"/>
+          <p:nvPr/>
+        </p:nvSpPr>
+        <p:spPr>
+          <a:xfrm>
+            <a:off x="463775" y="2623580"/>
+            <a:ext cx="964289" cy="923330"/>
+          </a:xfrm>
+          <a:prstGeom prst="rect">
+            <a:avLst/>
+          </a:prstGeom>
+          <a:solidFill>
+            <a:srgbClr val="FFFFFF"/>
+          </a:solidFill>
+        </p:spPr>
+        <p:txBody>
+          <a:bodyPr wrap="none" rtlCol="0">
+            <a:spAutoFit/>
+          </a:bodyPr>
+          <a:lstStyle/>
+          <a:p>
+            <a:r>
+              <a:rPr lang="en-US" dirty="0" smtClean="0">
+                <a:solidFill>
+                  <a:srgbClr val="FF0000"/>
+                </a:solidFill>
+              </a:rPr>
+              <a:t>  0.12</a:t>
+            </a:r>
+            <a:r>
+              <a:rPr lang="en-US" dirty="0" smtClean="0">
+                <a:solidFill>
+                  <a:srgbClr val="FF0000"/>
+                </a:solidFill>
+                <a:latin typeface="Symbol" charset="2"/>
+                <a:cs typeface="Symbol" charset="2"/>
+              </a:rPr>
+              <a:t>l</a:t>
+            </a:r>
+          </a:p>
+          <a:p>
+            <a:r>
+              <a:rPr lang="en-US" dirty="0" smtClean="0">
+                <a:solidFill>
+                  <a:srgbClr val="FF0000"/>
+                </a:solidFill>
+              </a:rPr>
+              <a:t>+0.375</a:t>
+            </a:r>
+            <a:r>
+              <a:rPr lang="en-US" dirty="0" smtClean="0">
+                <a:solidFill>
+                  <a:srgbClr val="FF0000"/>
+                </a:solidFill>
+                <a:latin typeface="Symbol" charset="2"/>
+                <a:cs typeface="Symbol" charset="2"/>
+              </a:rPr>
+              <a:t>l</a:t>
+            </a:r>
+          </a:p>
+          <a:p>
+            <a:r>
+              <a:rPr lang="en-US" dirty="0" smtClean="0">
+                <a:solidFill>
+                  <a:srgbClr val="FF0000"/>
+                </a:solidFill>
+                <a:latin typeface="Symbol" charset="2"/>
+                <a:cs typeface="Symbol" charset="2"/>
+              </a:rPr>
+              <a:t>=</a:t>
+            </a:r>
+            <a:r>
+              <a:rPr lang="en-US" dirty="0" smtClean="0">
+                <a:solidFill>
+                  <a:srgbClr val="FF0000"/>
+                </a:solidFill>
+              </a:rPr>
+              <a:t>0.495</a:t>
+            </a:r>
+            <a:r>
+              <a:rPr lang="en-US" dirty="0" smtClean="0">
+                <a:solidFill>
+                  <a:srgbClr val="FF0000"/>
+                </a:solidFill>
+                <a:latin typeface="Symbol" charset="2"/>
+                <a:cs typeface="Symbol" charset="2"/>
+              </a:rPr>
+              <a:t>l</a:t>
+            </a:r>
+            <a:endParaRPr lang="en-US" dirty="0">
+              <a:solidFill>
+                <a:srgbClr val="FF0000"/>
+              </a:solidFill>
+            </a:endParaRPr>
+          </a:p>
+        </p:txBody>
+      </p:sp>
+      <p:cxnSp>
+        <p:nvCxnSpPr>
+          <p:cNvPr id="16" name="Straight Connector 15"/>
+          <p:cNvCxnSpPr/>
+          <p:nvPr/>
+        </p:nvCxnSpPr>
+        <p:spPr>
+          <a:xfrm flipH="1">
+            <a:off x="1190647" y="3481691"/>
+            <a:ext cx="3588352" cy="229269"/>
+          </a:xfrm>
+          <a:prstGeom prst="line">
+            <a:avLst/>
+          </a:prstGeom>
+          <a:ln>
+            <a:solidFill>
+              <a:srgbClr val="FF0000"/>
+            </a:solidFill>
+            <a:prstDash val="sysDash"/>
+          </a:ln>
+          <a:effectLst/>
+        </p:spPr>
+        <p:style>
+          <a:lnRef idx="2">
+            <a:schemeClr val="accent1"/>
+          </a:lnRef>
+          <a:fillRef idx="0">
+            <a:schemeClr val="accent1"/>
+          </a:fillRef>
+          <a:effectRef idx="1">
+            <a:schemeClr val="accent1"/>
+          </a:effectRef>
+          <a:fontRef idx="minor">
+            <a:schemeClr val="tx1"/>
+          </a:fontRef>
+        </p:style>
+      </p:cxnSp>
+      <p:sp>
+        <p:nvSpPr>
+          <p:cNvPr id="17" name="Oval 16"/>
+          <p:cNvSpPr/>
+          <p:nvPr/>
+        </p:nvSpPr>
+        <p:spPr>
+          <a:xfrm>
+            <a:off x="3164070" y="3521426"/>
+            <a:ext cx="88122" cy="88122"/>
+          </a:xfrm>
+          <a:prstGeom prst="ellipse">
+            <a:avLst/>
+          </a:prstGeom>
+          <a:solidFill>
+            <a:srgbClr val="FF0000"/>
+          </a:solidFill>
+          <a:ln>
+            <a:solidFill>
+              <a:schemeClr val="tx1"/>
+            </a:solidFill>
+          </a:ln>
+          <a:effectLst/>
+        </p:spPr>
+        <p:style>
+          <a:lnRef idx="1">
+            <a:schemeClr val="accent1"/>
+          </a:lnRef>
+          <a:fillRef idx="3">
+            <a:schemeClr val="accent1"/>
+          </a:fillRef>
+          <a:effectRef idx="2">
+            <a:schemeClr val="accent1"/>
+          </a:effectRef>
+          <a:fontRef idx="minor">
+            <a:schemeClr val="lt1"/>
+          </a:fontRef>
+        </p:style>
+        <p:txBody>
+          <a:bodyPr rtlCol="0" anchor="ctr"/>
+          <a:lstStyle/>
+          <a:p>
+            <a:pPr algn="ctr"/>
+            <a:endParaRPr lang="en-US"/>
+          </a:p>
+        </p:txBody>
+      </p:sp>
+      <p:cxnSp>
+        <p:nvCxnSpPr>
+          <p:cNvPr id="19" name="Straight Connector 18"/>
+          <p:cNvCxnSpPr/>
+          <p:nvPr/>
+        </p:nvCxnSpPr>
+        <p:spPr>
+          <a:xfrm>
+            <a:off x="535791" y="3241302"/>
+            <a:ext cx="767305" cy="0"/>
+          </a:xfrm>
+          <a:prstGeom prst="line">
+            <a:avLst/>
+          </a:prstGeom>
+          <a:ln>
+            <a:solidFill>
+              <a:srgbClr val="FF0000"/>
+            </a:solidFill>
+          </a:ln>
+          <a:effectLst/>
+        </p:spPr>
+        <p:style>
+          <a:lnRef idx="2">
+            <a:schemeClr val="accent1"/>
+          </a:lnRef>
+          <a:fillRef idx="0">
+            <a:schemeClr val="accent1"/>
+          </a:fillRef>
+          <a:effectRef idx="1">
+            <a:schemeClr val="accent1"/>
+          </a:effectRef>
+          <a:fontRef idx="minor">
+            <a:schemeClr val="tx1"/>
+          </a:fontRef>
+        </p:style>
+      </p:cxnSp>
+      <p:sp>
+        <p:nvSpPr>
+          <p:cNvPr id="18" name="TextBox 17"/>
+          <p:cNvSpPr txBox="1"/>
+          <p:nvPr/>
+        </p:nvSpPr>
+        <p:spPr>
+          <a:xfrm>
+            <a:off x="300365" y="5021407"/>
+            <a:ext cx="1643035" cy="646331"/>
+          </a:xfrm>
+          <a:prstGeom prst="rect">
+            <a:avLst/>
+          </a:prstGeom>
+          <a:solidFill>
+            <a:srgbClr val="FFFFFF"/>
+          </a:solidFill>
+        </p:spPr>
+        <p:txBody>
+          <a:bodyPr wrap="none" rtlCol="0">
+            <a:spAutoFit/>
+          </a:bodyPr>
+          <a:lstStyle/>
+          <a:p>
+            <a:r>
+              <a:rPr lang="en-US" dirty="0" err="1">
+                <a:solidFill>
+                  <a:srgbClr val="FF0000"/>
+                </a:solidFill>
+              </a:rPr>
+              <a:t>Z</a:t>
+            </a:r>
+            <a:r>
+              <a:rPr lang="en-US" baseline="-25000" dirty="0" err="1" smtClean="0">
+                <a:solidFill>
+                  <a:srgbClr val="FF0000"/>
+                </a:solidFill>
+              </a:rPr>
+              <a:t>in</a:t>
+            </a:r>
+            <a:r>
+              <a:rPr lang="en-US" dirty="0" smtClean="0">
+                <a:solidFill>
+                  <a:srgbClr val="FF0000"/>
+                </a:solidFill>
+              </a:rPr>
+              <a:t> = Z</a:t>
+            </a:r>
+            <a:r>
+              <a:rPr lang="en-US" baseline="-25000" dirty="0" smtClean="0">
+                <a:solidFill>
+                  <a:srgbClr val="FF0000"/>
+                </a:solidFill>
+              </a:rPr>
+              <a:t>0</a:t>
+            </a:r>
+            <a:r>
+              <a:rPr lang="en-US" dirty="0" smtClean="0">
+                <a:solidFill>
+                  <a:srgbClr val="FF0000"/>
+                </a:solidFill>
+              </a:rPr>
+              <a:t>z</a:t>
+            </a:r>
+            <a:r>
+              <a:rPr lang="en-US" baseline="-25000" dirty="0" smtClean="0">
+                <a:solidFill>
+                  <a:srgbClr val="FF0000"/>
+                </a:solidFill>
+              </a:rPr>
+              <a:t>in</a:t>
+            </a:r>
+          </a:p>
+          <a:p>
+            <a:r>
+              <a:rPr lang="en-US" dirty="0" smtClean="0">
+                <a:solidFill>
+                  <a:srgbClr val="FF0000"/>
+                </a:solidFill>
+              </a:rPr>
+              <a:t>     = 15 </a:t>
+            </a:r>
+            <a:r>
+              <a:rPr lang="en-US" dirty="0" smtClean="0">
+                <a:solidFill>
+                  <a:srgbClr val="FF0000"/>
+                </a:solidFill>
+              </a:rPr>
+              <a:t>– j2.5 </a:t>
             </a:r>
             <a:r>
               <a:rPr lang="en-US" dirty="0" smtClean="0">
@@ -9167,217 +9507,10 @@
           </a:p>
         </p:txBody>
       </p:sp>
-      <p:sp>
-        <p:nvSpPr>
-          <p:cNvPr id="30" name="TextBox 29"/>
-          <p:cNvSpPr txBox="1"/>
-          <p:nvPr/>
-        </p:nvSpPr>
-        <p:spPr>
-          <a:xfrm>
-            <a:off x="7612056" y="394585"/>
-            <a:ext cx="847295" cy="923330"/>
-          </a:xfrm>
-          <a:prstGeom prst="rect">
-            <a:avLst/>
-          </a:prstGeom>
-          <a:solidFill>
-            <a:srgbClr val="FFFFFF"/>
-          </a:solidFill>
-        </p:spPr>
-        <p:txBody>
-          <a:bodyPr wrap="none" rtlCol="0">
-            <a:spAutoFit/>
-          </a:bodyPr>
-          <a:lstStyle/>
-          <a:p>
-            <a:r>
-              <a:rPr lang="en-US" dirty="0" smtClean="0">
-                <a:solidFill>
-                  <a:srgbClr val="FF0000"/>
-                </a:solidFill>
-              </a:rPr>
-              <a:t>  0.25</a:t>
-            </a:r>
-            <a:r>
-              <a:rPr lang="en-US" dirty="0" smtClean="0">
-                <a:solidFill>
-                  <a:srgbClr val="FF0000"/>
-                </a:solidFill>
-                <a:latin typeface="Symbol" charset="2"/>
-                <a:cs typeface="Symbol" charset="2"/>
-              </a:rPr>
-              <a:t>l</a:t>
-            </a:r>
-          </a:p>
-          <a:p>
-            <a:r>
-              <a:rPr lang="en-US" smtClean="0">
-                <a:solidFill>
-                  <a:srgbClr val="FF0000"/>
-                </a:solidFill>
-              </a:rPr>
-              <a:t> -</a:t>
-            </a:r>
-            <a:r>
-              <a:rPr lang="en-US" smtClean="0">
-                <a:solidFill>
-                  <a:srgbClr val="FF0000"/>
-                </a:solidFill>
-              </a:rPr>
-              <a:t>0.12</a:t>
-            </a:r>
-            <a:r>
-              <a:rPr lang="en-US" smtClean="0">
-                <a:solidFill>
-                  <a:srgbClr val="FF0000"/>
-                </a:solidFill>
-                <a:latin typeface="Symbol" charset="2"/>
-                <a:cs typeface="Symbol" charset="2"/>
-              </a:rPr>
-              <a:t>l</a:t>
-            </a:r>
-            <a:endParaRPr lang="en-US" dirty="0" smtClean="0">
-              <a:solidFill>
-                <a:srgbClr val="FF0000"/>
-              </a:solidFill>
-              <a:latin typeface="Symbol" charset="2"/>
-              <a:cs typeface="Symbol" charset="2"/>
-            </a:endParaRPr>
-          </a:p>
-          <a:p>
-            <a:r>
-              <a:rPr lang="en-US" dirty="0" smtClean="0">
-                <a:solidFill>
-                  <a:srgbClr val="FF0000"/>
-                </a:solidFill>
-                <a:latin typeface="Symbol" charset="2"/>
-                <a:cs typeface="Symbol" charset="2"/>
-              </a:rPr>
-              <a:t>=</a:t>
-            </a:r>
-            <a:r>
-              <a:rPr lang="en-US" dirty="0" smtClean="0">
-                <a:solidFill>
-                  <a:srgbClr val="FF0000"/>
-                </a:solidFill>
-              </a:rPr>
-              <a:t>0.13</a:t>
-            </a:r>
-            <a:r>
-              <a:rPr lang="en-US" dirty="0" smtClean="0">
-                <a:solidFill>
-                  <a:srgbClr val="FF0000"/>
-                </a:solidFill>
-                <a:latin typeface="Symbol" charset="2"/>
-                <a:cs typeface="Symbol" charset="2"/>
-              </a:rPr>
-              <a:t>l</a:t>
-            </a:r>
-            <a:endParaRPr lang="en-US" dirty="0">
-              <a:solidFill>
-                <a:srgbClr val="FF0000"/>
-              </a:solidFill>
-            </a:endParaRPr>
-          </a:p>
-        </p:txBody>
-      </p:sp>
-      <p:cxnSp>
-        <p:nvCxnSpPr>
-          <p:cNvPr id="31" name="Straight Connector 30"/>
-          <p:cNvCxnSpPr/>
-          <p:nvPr/>
-        </p:nvCxnSpPr>
-        <p:spPr>
-          <a:xfrm>
-            <a:off x="7679078" y="1014904"/>
-            <a:ext cx="767305" cy="0"/>
-          </a:xfrm>
-          <a:prstGeom prst="line">
-            <a:avLst/>
-          </a:prstGeom>
-          <a:ln>
-            <a:solidFill>
-              <a:srgbClr val="FF0000"/>
-            </a:solidFill>
-          </a:ln>
-          <a:effectLst/>
-        </p:spPr>
-        <p:style>
-          <a:lnRef idx="2">
-            <a:schemeClr val="accent1"/>
-          </a:lnRef>
-          <a:fillRef idx="0">
-            <a:schemeClr val="accent1"/>
-          </a:fillRef>
-          <a:effectRef idx="1">
-            <a:schemeClr val="accent1"/>
-          </a:effectRef>
-          <a:fontRef idx="minor">
-            <a:schemeClr val="tx1"/>
-          </a:fontRef>
-        </p:style>
-      </p:cxnSp>
-      <p:sp>
-        <p:nvSpPr>
-          <p:cNvPr id="32" name="TextBox 31"/>
-          <p:cNvSpPr txBox="1"/>
-          <p:nvPr/>
-        </p:nvSpPr>
-        <p:spPr>
-          <a:xfrm>
-            <a:off x="6585441" y="5393"/>
-            <a:ext cx="2053229" cy="523220"/>
-          </a:xfrm>
-          <a:prstGeom prst="rect">
-            <a:avLst/>
-          </a:prstGeom>
-          <a:noFill/>
-        </p:spPr>
-        <p:txBody>
-          <a:bodyPr wrap="none" rtlCol="0">
-            <a:spAutoFit/>
-          </a:bodyPr>
-          <a:lstStyle/>
-          <a:p>
-            <a:r>
-              <a:rPr lang="en-US" sz="1400" dirty="0" smtClean="0">
-                <a:solidFill>
-                  <a:srgbClr val="FF0000"/>
-                </a:solidFill>
-              </a:rPr>
-              <a:t>Distance to first voltage</a:t>
-            </a:r>
-          </a:p>
-          <a:p>
-            <a:r>
-              <a:rPr lang="en-US" sz="1400" dirty="0">
-                <a:solidFill>
-                  <a:srgbClr val="FF0000"/>
-                </a:solidFill>
-              </a:rPr>
-              <a:t>s</a:t>
-            </a:r>
-            <a:r>
-              <a:rPr lang="en-US" sz="1400" dirty="0" smtClean="0">
-                <a:solidFill>
-                  <a:srgbClr val="FF0000"/>
-                </a:solidFill>
-              </a:rPr>
-              <a:t>tanding wave maximum:</a:t>
-            </a:r>
-            <a:endParaRPr lang="en-US" sz="1400" dirty="0">
-              <a:solidFill>
-                <a:srgbClr val="FF0000"/>
-              </a:solidFill>
-            </a:endParaRPr>
-          </a:p>
-        </p:txBody>
-      </p:sp>
     </p:spTree>
     <p:extLst>
       <p:ext uri="{BB962C8B-B14F-4D97-AF65-F5344CB8AC3E}">
-        <p14:creationId xmlns:p14="http://schemas.microsoft.com/office/powerpoint/2010/main" val="593265578"/>
+        <p14:creationId xmlns:p14="http://schemas.microsoft.com/office/powerpoint/2010/main" val="4152098040"/>
       </p:ext>
     </p:extLst>
   </p:cSld>

</xml_diff>